<commit_message>
Add Informations for the Final Presentation
</commit_message>
<xml_diff>
--- a/documents/projectmanagement/Praesentationen/Abschlusspräsentation.pptx
+++ b/documents/projectmanagement/Praesentationen/Abschlusspräsentation.pptx
@@ -5,17 +5,21 @@
     <p:sldMasterId id="2147483648" r:id="rId1"/>
   </p:sldMasterIdLst>
   <p:notesMasterIdLst>
-    <p:notesMasterId r:id="rId10"/>
+    <p:notesMasterId r:id="rId14"/>
   </p:notesMasterIdLst>
   <p:sldIdLst>
     <p:sldId id="256" r:id="rId2"/>
     <p:sldId id="257" r:id="rId3"/>
     <p:sldId id="258" r:id="rId4"/>
-    <p:sldId id="287" r:id="rId5"/>
-    <p:sldId id="290" r:id="rId6"/>
-    <p:sldId id="289" r:id="rId7"/>
-    <p:sldId id="291" r:id="rId8"/>
-    <p:sldId id="292" r:id="rId9"/>
+    <p:sldId id="293" r:id="rId5"/>
+    <p:sldId id="287" r:id="rId6"/>
+    <p:sldId id="294" r:id="rId7"/>
+    <p:sldId id="295" r:id="rId8"/>
+    <p:sldId id="290" r:id="rId9"/>
+    <p:sldId id="289" r:id="rId10"/>
+    <p:sldId id="291" r:id="rId11"/>
+    <p:sldId id="296" r:id="rId12"/>
+    <p:sldId id="292" r:id="rId13"/>
   </p:sldIdLst>
   <p:sldSz cx="12192000" cy="6858000"/>
   <p:notesSz cx="6858000" cy="9144000"/>
@@ -123,6 +127,753 @@
 </file>
 
 <file path=ppt/diagrams/colors1.xml><?xml version="1.0" encoding="utf-8"?>
+<dgm:colorsDef xmlns:dgm="http://schemas.openxmlformats.org/drawingml/2006/diagram" xmlns:a="http://schemas.openxmlformats.org/drawingml/2006/main" uniqueId="urn:microsoft.com/office/officeart/2005/8/colors/accent1_2">
+  <dgm:title val=""/>
+  <dgm:desc val=""/>
+  <dgm:catLst>
+    <dgm:cat type="accent1" pri="11200"/>
+  </dgm:catLst>
+  <dgm:styleLbl name="node0">
+    <dgm:fillClrLst meth="repeat">
+      <a:schemeClr val="accent1"/>
+    </dgm:fillClrLst>
+    <dgm:linClrLst meth="repeat">
+      <a:schemeClr val="lt1"/>
+    </dgm:linClrLst>
+    <dgm:effectClrLst/>
+    <dgm:txLinClrLst/>
+    <dgm:txFillClrLst/>
+    <dgm:txEffectClrLst/>
+  </dgm:styleLbl>
+  <dgm:styleLbl name="alignNode1">
+    <dgm:fillClrLst meth="repeat">
+      <a:schemeClr val="accent1"/>
+    </dgm:fillClrLst>
+    <dgm:linClrLst meth="repeat">
+      <a:schemeClr val="accent1"/>
+    </dgm:linClrLst>
+    <dgm:effectClrLst/>
+    <dgm:txLinClrLst/>
+    <dgm:txFillClrLst/>
+    <dgm:txEffectClrLst/>
+  </dgm:styleLbl>
+  <dgm:styleLbl name="node1">
+    <dgm:fillClrLst meth="repeat">
+      <a:schemeClr val="accent1"/>
+    </dgm:fillClrLst>
+    <dgm:linClrLst meth="repeat">
+      <a:schemeClr val="lt1"/>
+    </dgm:linClrLst>
+    <dgm:effectClrLst/>
+    <dgm:txLinClrLst/>
+    <dgm:txFillClrLst/>
+    <dgm:txEffectClrLst/>
+  </dgm:styleLbl>
+  <dgm:styleLbl name="lnNode1">
+    <dgm:fillClrLst meth="repeat">
+      <a:schemeClr val="accent1"/>
+    </dgm:fillClrLst>
+    <dgm:linClrLst meth="repeat">
+      <a:schemeClr val="lt1"/>
+    </dgm:linClrLst>
+    <dgm:effectClrLst/>
+    <dgm:txLinClrLst/>
+    <dgm:txFillClrLst/>
+    <dgm:txEffectClrLst/>
+  </dgm:styleLbl>
+  <dgm:styleLbl name="vennNode1">
+    <dgm:fillClrLst meth="repeat">
+      <a:schemeClr val="accent1">
+        <a:alpha val="50000"/>
+      </a:schemeClr>
+    </dgm:fillClrLst>
+    <dgm:linClrLst meth="repeat">
+      <a:schemeClr val="lt1"/>
+    </dgm:linClrLst>
+    <dgm:effectClrLst/>
+    <dgm:txLinClrLst/>
+    <dgm:txFillClrLst/>
+    <dgm:txEffectClrLst/>
+  </dgm:styleLbl>
+  <dgm:styleLbl name="node2">
+    <dgm:fillClrLst meth="repeat">
+      <a:schemeClr val="accent1"/>
+    </dgm:fillClrLst>
+    <dgm:linClrLst meth="repeat">
+      <a:schemeClr val="lt1"/>
+    </dgm:linClrLst>
+    <dgm:effectClrLst/>
+    <dgm:txLinClrLst/>
+    <dgm:txFillClrLst/>
+    <dgm:txEffectClrLst/>
+  </dgm:styleLbl>
+  <dgm:styleLbl name="node3">
+    <dgm:fillClrLst meth="repeat">
+      <a:schemeClr val="accent1"/>
+    </dgm:fillClrLst>
+    <dgm:linClrLst meth="repeat">
+      <a:schemeClr val="lt1"/>
+    </dgm:linClrLst>
+    <dgm:effectClrLst/>
+    <dgm:txLinClrLst/>
+    <dgm:txFillClrLst/>
+    <dgm:txEffectClrLst/>
+  </dgm:styleLbl>
+  <dgm:styleLbl name="node4">
+    <dgm:fillClrLst meth="repeat">
+      <a:schemeClr val="accent1"/>
+    </dgm:fillClrLst>
+    <dgm:linClrLst meth="repeat">
+      <a:schemeClr val="lt1"/>
+    </dgm:linClrLst>
+    <dgm:effectClrLst/>
+    <dgm:txLinClrLst/>
+    <dgm:txFillClrLst/>
+    <dgm:txEffectClrLst/>
+  </dgm:styleLbl>
+  <dgm:styleLbl name="fgImgPlace1">
+    <dgm:fillClrLst meth="repeat">
+      <a:schemeClr val="accent1">
+        <a:tint val="50000"/>
+      </a:schemeClr>
+    </dgm:fillClrLst>
+    <dgm:linClrLst meth="repeat">
+      <a:schemeClr val="lt1"/>
+    </dgm:linClrLst>
+    <dgm:effectClrLst/>
+    <dgm:txLinClrLst/>
+    <dgm:txFillClrLst meth="repeat">
+      <a:schemeClr val="lt1"/>
+    </dgm:txFillClrLst>
+    <dgm:txEffectClrLst/>
+  </dgm:styleLbl>
+  <dgm:styleLbl name="alignImgPlace1">
+    <dgm:fillClrLst meth="repeat">
+      <a:schemeClr val="accent1">
+        <a:tint val="50000"/>
+      </a:schemeClr>
+    </dgm:fillClrLst>
+    <dgm:linClrLst meth="repeat">
+      <a:schemeClr val="lt1"/>
+    </dgm:linClrLst>
+    <dgm:effectClrLst/>
+    <dgm:txLinClrLst/>
+    <dgm:txFillClrLst meth="repeat">
+      <a:schemeClr val="lt1"/>
+    </dgm:txFillClrLst>
+    <dgm:txEffectClrLst/>
+  </dgm:styleLbl>
+  <dgm:styleLbl name="bgImgPlace1">
+    <dgm:fillClrLst meth="repeat">
+      <a:schemeClr val="accent1">
+        <a:tint val="50000"/>
+      </a:schemeClr>
+    </dgm:fillClrLst>
+    <dgm:linClrLst meth="repeat">
+      <a:schemeClr val="lt1"/>
+    </dgm:linClrLst>
+    <dgm:effectClrLst/>
+    <dgm:txLinClrLst/>
+    <dgm:txFillClrLst meth="repeat">
+      <a:schemeClr val="lt1"/>
+    </dgm:txFillClrLst>
+    <dgm:txEffectClrLst/>
+  </dgm:styleLbl>
+  <dgm:styleLbl name="sibTrans2D1">
+    <dgm:fillClrLst meth="repeat">
+      <a:schemeClr val="accent1">
+        <a:tint val="60000"/>
+      </a:schemeClr>
+    </dgm:fillClrLst>
+    <dgm:linClrLst meth="repeat">
+      <a:schemeClr val="accent1">
+        <a:tint val="60000"/>
+      </a:schemeClr>
+    </dgm:linClrLst>
+    <dgm:effectClrLst/>
+    <dgm:txLinClrLst/>
+    <dgm:txFillClrLst/>
+    <dgm:txEffectClrLst/>
+  </dgm:styleLbl>
+  <dgm:styleLbl name="fgSibTrans2D1">
+    <dgm:fillClrLst meth="repeat">
+      <a:schemeClr val="accent1">
+        <a:tint val="60000"/>
+      </a:schemeClr>
+    </dgm:fillClrLst>
+    <dgm:linClrLst meth="repeat">
+      <a:schemeClr val="accent1">
+        <a:tint val="60000"/>
+      </a:schemeClr>
+    </dgm:linClrLst>
+    <dgm:effectClrLst/>
+    <dgm:txLinClrLst/>
+    <dgm:txFillClrLst/>
+    <dgm:txEffectClrLst/>
+  </dgm:styleLbl>
+  <dgm:styleLbl name="bgSibTrans2D1">
+    <dgm:fillClrLst meth="repeat">
+      <a:schemeClr val="accent1">
+        <a:tint val="60000"/>
+      </a:schemeClr>
+    </dgm:fillClrLst>
+    <dgm:linClrLst meth="repeat">
+      <a:schemeClr val="accent1">
+        <a:tint val="60000"/>
+      </a:schemeClr>
+    </dgm:linClrLst>
+    <dgm:effectClrLst/>
+    <dgm:txLinClrLst/>
+    <dgm:txFillClrLst/>
+    <dgm:txEffectClrLst/>
+  </dgm:styleLbl>
+  <dgm:styleLbl name="sibTrans1D1">
+    <dgm:fillClrLst meth="repeat">
+      <a:schemeClr val="accent1"/>
+    </dgm:fillClrLst>
+    <dgm:linClrLst meth="repeat">
+      <a:schemeClr val="accent1"/>
+    </dgm:linClrLst>
+    <dgm:effectClrLst/>
+    <dgm:txLinClrLst/>
+    <dgm:txFillClrLst meth="repeat">
+      <a:schemeClr val="tx1"/>
+    </dgm:txFillClrLst>
+    <dgm:txEffectClrLst/>
+  </dgm:styleLbl>
+  <dgm:styleLbl name="callout">
+    <dgm:fillClrLst meth="repeat">
+      <a:schemeClr val="accent1"/>
+    </dgm:fillClrLst>
+    <dgm:linClrLst meth="repeat">
+      <a:schemeClr val="accent1">
+        <a:tint val="50000"/>
+      </a:schemeClr>
+    </dgm:linClrLst>
+    <dgm:effectClrLst/>
+    <dgm:txLinClrLst/>
+    <dgm:txFillClrLst meth="repeat">
+      <a:schemeClr val="tx1"/>
+    </dgm:txFillClrLst>
+    <dgm:txEffectClrLst/>
+  </dgm:styleLbl>
+  <dgm:styleLbl name="asst0">
+    <dgm:fillClrLst meth="repeat">
+      <a:schemeClr val="accent1"/>
+    </dgm:fillClrLst>
+    <dgm:linClrLst meth="repeat">
+      <a:schemeClr val="lt1"/>
+    </dgm:linClrLst>
+    <dgm:effectClrLst/>
+    <dgm:txLinClrLst/>
+    <dgm:txFillClrLst/>
+    <dgm:txEffectClrLst/>
+  </dgm:styleLbl>
+  <dgm:styleLbl name="asst1">
+    <dgm:fillClrLst meth="repeat">
+      <a:schemeClr val="accent1"/>
+    </dgm:fillClrLst>
+    <dgm:linClrLst meth="repeat">
+      <a:schemeClr val="lt1"/>
+    </dgm:linClrLst>
+    <dgm:effectClrLst/>
+    <dgm:txLinClrLst/>
+    <dgm:txFillClrLst/>
+    <dgm:txEffectClrLst/>
+  </dgm:styleLbl>
+  <dgm:styleLbl name="asst2">
+    <dgm:fillClrLst meth="repeat">
+      <a:schemeClr val="accent1"/>
+    </dgm:fillClrLst>
+    <dgm:linClrLst meth="repeat">
+      <a:schemeClr val="lt1"/>
+    </dgm:linClrLst>
+    <dgm:effectClrLst/>
+    <dgm:txLinClrLst/>
+    <dgm:txFillClrLst/>
+    <dgm:txEffectClrLst/>
+  </dgm:styleLbl>
+  <dgm:styleLbl name="asst3">
+    <dgm:fillClrLst meth="repeat">
+      <a:schemeClr val="accent1"/>
+    </dgm:fillClrLst>
+    <dgm:linClrLst meth="repeat">
+      <a:schemeClr val="lt1"/>
+    </dgm:linClrLst>
+    <dgm:effectClrLst/>
+    <dgm:txLinClrLst/>
+    <dgm:txFillClrLst/>
+    <dgm:txEffectClrLst/>
+  </dgm:styleLbl>
+  <dgm:styleLbl name="asst4">
+    <dgm:fillClrLst meth="repeat">
+      <a:schemeClr val="accent1"/>
+    </dgm:fillClrLst>
+    <dgm:linClrLst meth="repeat">
+      <a:schemeClr val="lt1"/>
+    </dgm:linClrLst>
+    <dgm:effectClrLst/>
+    <dgm:txLinClrLst/>
+    <dgm:txFillClrLst/>
+    <dgm:txEffectClrLst/>
+  </dgm:styleLbl>
+  <dgm:styleLbl name="parChTrans2D1">
+    <dgm:fillClrLst meth="repeat">
+      <a:schemeClr val="accent1">
+        <a:tint val="60000"/>
+      </a:schemeClr>
+    </dgm:fillClrLst>
+    <dgm:linClrLst meth="repeat">
+      <a:schemeClr val="accent1">
+        <a:tint val="60000"/>
+      </a:schemeClr>
+    </dgm:linClrLst>
+    <dgm:effectClrLst/>
+    <dgm:txLinClrLst/>
+    <dgm:txFillClrLst meth="repeat">
+      <a:schemeClr val="lt1"/>
+    </dgm:txFillClrLst>
+    <dgm:txEffectClrLst/>
+  </dgm:styleLbl>
+  <dgm:styleLbl name="parChTrans2D2">
+    <dgm:fillClrLst meth="repeat">
+      <a:schemeClr val="accent1"/>
+    </dgm:fillClrLst>
+    <dgm:linClrLst meth="repeat">
+      <a:schemeClr val="accent1"/>
+    </dgm:linClrLst>
+    <dgm:effectClrLst/>
+    <dgm:txLinClrLst/>
+    <dgm:txFillClrLst meth="repeat">
+      <a:schemeClr val="lt1"/>
+    </dgm:txFillClrLst>
+    <dgm:txEffectClrLst/>
+  </dgm:styleLbl>
+  <dgm:styleLbl name="parChTrans2D3">
+    <dgm:fillClrLst meth="repeat">
+      <a:schemeClr val="accent1"/>
+    </dgm:fillClrLst>
+    <dgm:linClrLst meth="repeat">
+      <a:schemeClr val="accent1"/>
+    </dgm:linClrLst>
+    <dgm:effectClrLst/>
+    <dgm:txLinClrLst/>
+    <dgm:txFillClrLst meth="repeat">
+      <a:schemeClr val="lt1"/>
+    </dgm:txFillClrLst>
+    <dgm:txEffectClrLst/>
+  </dgm:styleLbl>
+  <dgm:styleLbl name="parChTrans2D4">
+    <dgm:fillClrLst meth="repeat">
+      <a:schemeClr val="accent1"/>
+    </dgm:fillClrLst>
+    <dgm:linClrLst meth="repeat">
+      <a:schemeClr val="accent1"/>
+    </dgm:linClrLst>
+    <dgm:effectClrLst/>
+    <dgm:txLinClrLst/>
+    <dgm:txFillClrLst meth="repeat">
+      <a:schemeClr val="lt1"/>
+    </dgm:txFillClrLst>
+    <dgm:txEffectClrLst/>
+  </dgm:styleLbl>
+  <dgm:styleLbl name="parChTrans1D1">
+    <dgm:fillClrLst meth="repeat">
+      <a:schemeClr val="accent1"/>
+    </dgm:fillClrLst>
+    <dgm:linClrLst meth="repeat">
+      <a:schemeClr val="accent1">
+        <a:shade val="60000"/>
+      </a:schemeClr>
+    </dgm:linClrLst>
+    <dgm:effectClrLst/>
+    <dgm:txLinClrLst/>
+    <dgm:txFillClrLst meth="repeat">
+      <a:schemeClr val="tx1"/>
+    </dgm:txFillClrLst>
+    <dgm:txEffectClrLst/>
+  </dgm:styleLbl>
+  <dgm:styleLbl name="parChTrans1D2">
+    <dgm:fillClrLst meth="repeat">
+      <a:schemeClr val="accent1"/>
+    </dgm:fillClrLst>
+    <dgm:linClrLst meth="repeat">
+      <a:schemeClr val="accent1">
+        <a:shade val="60000"/>
+      </a:schemeClr>
+    </dgm:linClrLst>
+    <dgm:effectClrLst/>
+    <dgm:txLinClrLst/>
+    <dgm:txFillClrLst meth="repeat">
+      <a:schemeClr val="tx1"/>
+    </dgm:txFillClrLst>
+    <dgm:txEffectClrLst/>
+  </dgm:styleLbl>
+  <dgm:styleLbl name="parChTrans1D3">
+    <dgm:fillClrLst meth="repeat">
+      <a:schemeClr val="accent1"/>
+    </dgm:fillClrLst>
+    <dgm:linClrLst meth="repeat">
+      <a:schemeClr val="accent1">
+        <a:shade val="80000"/>
+      </a:schemeClr>
+    </dgm:linClrLst>
+    <dgm:effectClrLst/>
+    <dgm:txLinClrLst/>
+    <dgm:txFillClrLst meth="repeat">
+      <a:schemeClr val="tx1"/>
+    </dgm:txFillClrLst>
+    <dgm:txEffectClrLst/>
+  </dgm:styleLbl>
+  <dgm:styleLbl name="parChTrans1D4">
+    <dgm:fillClrLst meth="repeat">
+      <a:schemeClr val="accent1"/>
+    </dgm:fillClrLst>
+    <dgm:linClrLst meth="repeat">
+      <a:schemeClr val="accent1">
+        <a:shade val="80000"/>
+      </a:schemeClr>
+    </dgm:linClrLst>
+    <dgm:effectClrLst/>
+    <dgm:txLinClrLst/>
+    <dgm:txFillClrLst meth="repeat">
+      <a:schemeClr val="tx1"/>
+    </dgm:txFillClrLst>
+    <dgm:txEffectClrLst/>
+  </dgm:styleLbl>
+  <dgm:styleLbl name="fgAcc1">
+    <dgm:fillClrLst meth="repeat">
+      <a:schemeClr val="lt1">
+        <a:alpha val="90000"/>
+      </a:schemeClr>
+    </dgm:fillClrLst>
+    <dgm:linClrLst meth="repeat">
+      <a:schemeClr val="accent1"/>
+    </dgm:linClrLst>
+    <dgm:effectClrLst/>
+    <dgm:txLinClrLst/>
+    <dgm:txFillClrLst meth="repeat">
+      <a:schemeClr val="dk1"/>
+    </dgm:txFillClrLst>
+    <dgm:txEffectClrLst/>
+  </dgm:styleLbl>
+  <dgm:styleLbl name="conFgAcc1">
+    <dgm:fillClrLst meth="repeat">
+      <a:schemeClr val="lt1">
+        <a:alpha val="90000"/>
+      </a:schemeClr>
+    </dgm:fillClrLst>
+    <dgm:linClrLst meth="repeat">
+      <a:schemeClr val="accent1"/>
+    </dgm:linClrLst>
+    <dgm:effectClrLst/>
+    <dgm:txLinClrLst/>
+    <dgm:txFillClrLst meth="repeat">
+      <a:schemeClr val="dk1"/>
+    </dgm:txFillClrLst>
+    <dgm:txEffectClrLst/>
+  </dgm:styleLbl>
+  <dgm:styleLbl name="alignAcc1">
+    <dgm:fillClrLst meth="repeat">
+      <a:schemeClr val="lt1">
+        <a:alpha val="90000"/>
+      </a:schemeClr>
+    </dgm:fillClrLst>
+    <dgm:linClrLst meth="repeat">
+      <a:schemeClr val="accent1"/>
+    </dgm:linClrLst>
+    <dgm:effectClrLst/>
+    <dgm:txLinClrLst/>
+    <dgm:txFillClrLst meth="repeat">
+      <a:schemeClr val="dk1"/>
+    </dgm:txFillClrLst>
+    <dgm:txEffectClrLst/>
+  </dgm:styleLbl>
+  <dgm:styleLbl name="trAlignAcc1">
+    <dgm:fillClrLst meth="repeat">
+      <a:schemeClr val="lt1">
+        <a:alpha val="40000"/>
+      </a:schemeClr>
+    </dgm:fillClrLst>
+    <dgm:linClrLst meth="repeat">
+      <a:schemeClr val="accent1"/>
+    </dgm:linClrLst>
+    <dgm:effectClrLst/>
+    <dgm:txLinClrLst/>
+    <dgm:txFillClrLst meth="repeat">
+      <a:schemeClr val="dk1"/>
+    </dgm:txFillClrLst>
+    <dgm:txEffectClrLst/>
+  </dgm:styleLbl>
+  <dgm:styleLbl name="bgAcc1">
+    <dgm:fillClrLst meth="repeat">
+      <a:schemeClr val="lt1">
+        <a:alpha val="90000"/>
+      </a:schemeClr>
+    </dgm:fillClrLst>
+    <dgm:linClrLst meth="repeat">
+      <a:schemeClr val="accent1"/>
+    </dgm:linClrLst>
+    <dgm:effectClrLst/>
+    <dgm:txLinClrLst/>
+    <dgm:txFillClrLst meth="repeat">
+      <a:schemeClr val="dk1"/>
+    </dgm:txFillClrLst>
+    <dgm:txEffectClrLst/>
+  </dgm:styleLbl>
+  <dgm:styleLbl name="solidFgAcc1">
+    <dgm:fillClrLst meth="repeat">
+      <a:schemeClr val="lt1"/>
+    </dgm:fillClrLst>
+    <dgm:linClrLst meth="repeat">
+      <a:schemeClr val="accent1"/>
+    </dgm:linClrLst>
+    <dgm:effectClrLst/>
+    <dgm:txLinClrLst/>
+    <dgm:txFillClrLst meth="repeat">
+      <a:schemeClr val="dk1"/>
+    </dgm:txFillClrLst>
+    <dgm:txEffectClrLst/>
+  </dgm:styleLbl>
+  <dgm:styleLbl name="solidAlignAcc1">
+    <dgm:fillClrLst meth="repeat">
+      <a:schemeClr val="lt1"/>
+    </dgm:fillClrLst>
+    <dgm:linClrLst meth="repeat">
+      <a:schemeClr val="accent1"/>
+    </dgm:linClrLst>
+    <dgm:effectClrLst/>
+    <dgm:txLinClrLst/>
+    <dgm:txFillClrLst meth="repeat">
+      <a:schemeClr val="dk1"/>
+    </dgm:txFillClrLst>
+    <dgm:txEffectClrLst/>
+  </dgm:styleLbl>
+  <dgm:styleLbl name="solidBgAcc1">
+    <dgm:fillClrLst meth="repeat">
+      <a:schemeClr val="lt1"/>
+    </dgm:fillClrLst>
+    <dgm:linClrLst meth="repeat">
+      <a:schemeClr val="accent1"/>
+    </dgm:linClrLst>
+    <dgm:effectClrLst/>
+    <dgm:txLinClrLst/>
+    <dgm:txFillClrLst meth="repeat">
+      <a:schemeClr val="dk1"/>
+    </dgm:txFillClrLst>
+    <dgm:txEffectClrLst/>
+  </dgm:styleLbl>
+  <dgm:styleLbl name="fgAccFollowNode1">
+    <dgm:fillClrLst meth="repeat">
+      <a:schemeClr val="accent1">
+        <a:alpha val="90000"/>
+        <a:tint val="40000"/>
+      </a:schemeClr>
+    </dgm:fillClrLst>
+    <dgm:linClrLst meth="repeat">
+      <a:schemeClr val="accent1">
+        <a:alpha val="90000"/>
+        <a:tint val="40000"/>
+      </a:schemeClr>
+    </dgm:linClrLst>
+    <dgm:effectClrLst/>
+    <dgm:txLinClrLst/>
+    <dgm:txFillClrLst meth="repeat">
+      <a:schemeClr val="dk1"/>
+    </dgm:txFillClrLst>
+    <dgm:txEffectClrLst/>
+  </dgm:styleLbl>
+  <dgm:styleLbl name="alignAccFollowNode1">
+    <dgm:fillClrLst meth="repeat">
+      <a:schemeClr val="accent1">
+        <a:alpha val="90000"/>
+        <a:tint val="40000"/>
+      </a:schemeClr>
+    </dgm:fillClrLst>
+    <dgm:linClrLst meth="repeat">
+      <a:schemeClr val="accent1">
+        <a:alpha val="90000"/>
+        <a:tint val="40000"/>
+      </a:schemeClr>
+    </dgm:linClrLst>
+    <dgm:effectClrLst/>
+    <dgm:txLinClrLst/>
+    <dgm:txFillClrLst meth="repeat">
+      <a:schemeClr val="dk1"/>
+    </dgm:txFillClrLst>
+    <dgm:txEffectClrLst/>
+  </dgm:styleLbl>
+  <dgm:styleLbl name="bgAccFollowNode1">
+    <dgm:fillClrLst meth="repeat">
+      <a:schemeClr val="accent1">
+        <a:alpha val="90000"/>
+        <a:tint val="40000"/>
+      </a:schemeClr>
+    </dgm:fillClrLst>
+    <dgm:linClrLst meth="repeat">
+      <a:schemeClr val="accent1">
+        <a:alpha val="90000"/>
+        <a:tint val="40000"/>
+      </a:schemeClr>
+    </dgm:linClrLst>
+    <dgm:effectClrLst/>
+    <dgm:txLinClrLst/>
+    <dgm:txFillClrLst meth="repeat">
+      <a:schemeClr val="dk1"/>
+    </dgm:txFillClrLst>
+    <dgm:txEffectClrLst/>
+  </dgm:styleLbl>
+  <dgm:styleLbl name="fgAcc0">
+    <dgm:fillClrLst meth="repeat">
+      <a:schemeClr val="lt1">
+        <a:alpha val="90000"/>
+      </a:schemeClr>
+    </dgm:fillClrLst>
+    <dgm:linClrLst meth="repeat">
+      <a:schemeClr val="accent1"/>
+    </dgm:linClrLst>
+    <dgm:effectClrLst/>
+    <dgm:txLinClrLst/>
+    <dgm:txFillClrLst meth="repeat">
+      <a:schemeClr val="dk1"/>
+    </dgm:txFillClrLst>
+    <dgm:txEffectClrLst/>
+  </dgm:styleLbl>
+  <dgm:styleLbl name="fgAcc2">
+    <dgm:fillClrLst meth="repeat">
+      <a:schemeClr val="lt1">
+        <a:alpha val="90000"/>
+      </a:schemeClr>
+    </dgm:fillClrLst>
+    <dgm:linClrLst meth="repeat">
+      <a:schemeClr val="accent1"/>
+    </dgm:linClrLst>
+    <dgm:effectClrLst/>
+    <dgm:txLinClrLst/>
+    <dgm:txFillClrLst meth="repeat">
+      <a:schemeClr val="dk1"/>
+    </dgm:txFillClrLst>
+    <dgm:txEffectClrLst/>
+  </dgm:styleLbl>
+  <dgm:styleLbl name="fgAcc3">
+    <dgm:fillClrLst meth="repeat">
+      <a:schemeClr val="lt1">
+        <a:alpha val="90000"/>
+      </a:schemeClr>
+    </dgm:fillClrLst>
+    <dgm:linClrLst meth="repeat">
+      <a:schemeClr val="accent1"/>
+    </dgm:linClrLst>
+    <dgm:effectClrLst/>
+    <dgm:txLinClrLst/>
+    <dgm:txFillClrLst meth="repeat">
+      <a:schemeClr val="dk1"/>
+    </dgm:txFillClrLst>
+    <dgm:txEffectClrLst/>
+  </dgm:styleLbl>
+  <dgm:styleLbl name="fgAcc4">
+    <dgm:fillClrLst meth="repeat">
+      <a:schemeClr val="lt1">
+        <a:alpha val="90000"/>
+      </a:schemeClr>
+    </dgm:fillClrLst>
+    <dgm:linClrLst meth="repeat">
+      <a:schemeClr val="accent1"/>
+    </dgm:linClrLst>
+    <dgm:effectClrLst/>
+    <dgm:txLinClrLst/>
+    <dgm:txFillClrLst meth="repeat">
+      <a:schemeClr val="dk1"/>
+    </dgm:txFillClrLst>
+    <dgm:txEffectClrLst/>
+  </dgm:styleLbl>
+  <dgm:styleLbl name="bgShp">
+    <dgm:fillClrLst meth="repeat">
+      <a:schemeClr val="accent1">
+        <a:tint val="40000"/>
+      </a:schemeClr>
+    </dgm:fillClrLst>
+    <dgm:linClrLst meth="repeat">
+      <a:schemeClr val="accent1"/>
+    </dgm:linClrLst>
+    <dgm:effectClrLst/>
+    <dgm:txLinClrLst/>
+    <dgm:txFillClrLst meth="repeat">
+      <a:schemeClr val="dk1"/>
+    </dgm:txFillClrLst>
+    <dgm:txEffectClrLst/>
+  </dgm:styleLbl>
+  <dgm:styleLbl name="dkBgShp">
+    <dgm:fillClrLst meth="repeat">
+      <a:schemeClr val="accent1">
+        <a:shade val="80000"/>
+      </a:schemeClr>
+    </dgm:fillClrLst>
+    <dgm:linClrLst meth="repeat">
+      <a:schemeClr val="accent1"/>
+    </dgm:linClrLst>
+    <dgm:effectClrLst/>
+    <dgm:txLinClrLst/>
+    <dgm:txFillClrLst meth="repeat">
+      <a:schemeClr val="lt1"/>
+    </dgm:txFillClrLst>
+    <dgm:txEffectClrLst/>
+  </dgm:styleLbl>
+  <dgm:styleLbl name="trBgShp">
+    <dgm:fillClrLst meth="repeat">
+      <a:schemeClr val="accent1">
+        <a:tint val="50000"/>
+        <a:alpha val="40000"/>
+      </a:schemeClr>
+    </dgm:fillClrLst>
+    <dgm:linClrLst meth="repeat">
+      <a:schemeClr val="accent1"/>
+    </dgm:linClrLst>
+    <dgm:effectClrLst/>
+    <dgm:txLinClrLst/>
+    <dgm:txFillClrLst meth="repeat">
+      <a:schemeClr val="lt1"/>
+    </dgm:txFillClrLst>
+    <dgm:txEffectClrLst/>
+  </dgm:styleLbl>
+  <dgm:styleLbl name="fgShp">
+    <dgm:fillClrLst meth="repeat">
+      <a:schemeClr val="accent1">
+        <a:tint val="60000"/>
+      </a:schemeClr>
+    </dgm:fillClrLst>
+    <dgm:linClrLst meth="repeat">
+      <a:schemeClr val="lt1"/>
+    </dgm:linClrLst>
+    <dgm:effectClrLst/>
+    <dgm:txLinClrLst/>
+    <dgm:txFillClrLst meth="repeat">
+      <a:schemeClr val="dk1"/>
+    </dgm:txFillClrLst>
+    <dgm:txEffectClrLst/>
+  </dgm:styleLbl>
+  <dgm:styleLbl name="revTx">
+    <dgm:fillClrLst meth="repeat">
+      <a:schemeClr val="lt1">
+        <a:alpha val="0"/>
+      </a:schemeClr>
+    </dgm:fillClrLst>
+    <dgm:linClrLst meth="repeat">
+      <a:schemeClr val="dk1">
+        <a:alpha val="0"/>
+      </a:schemeClr>
+    </dgm:linClrLst>
+    <dgm:effectClrLst/>
+    <dgm:txLinClrLst/>
+    <dgm:txFillClrLst meth="repeat">
+      <a:schemeClr val="tx1"/>
+    </dgm:txFillClrLst>
+    <dgm:txEffectClrLst/>
+  </dgm:styleLbl>
+</dgm:colorsDef>
+</file>
+
+<file path=ppt/diagrams/colors2.xml><?xml version="1.0" encoding="utf-8"?>
 <dgm:colorsDef xmlns:dgm="http://schemas.openxmlformats.org/drawingml/2006/diagram" xmlns:a="http://schemas.openxmlformats.org/drawingml/2006/main" uniqueId="urn:microsoft.com/office/officeart/2005/8/colors/accent1_2">
   <dgm:title val=""/>
   <dgm:desc val=""/>
@@ -1332,6 +2083,353 @@
     <dgm:cxn modelId="{A90F0781-8873-4DAE-B46D-FA2E71502016}" type="presParOf" srcId="{EE389596-78F7-48D1-89CB-7F16954A729C}" destId="{EBADB602-D542-4ECC-AFA1-51F9C27D40A0}" srcOrd="1" destOrd="0" presId="urn:microsoft.com/office/officeart/2005/8/layout/hList7"/>
     <dgm:cxn modelId="{B22266BD-68A4-402B-BD79-6CE3FBB4AF77}" type="presParOf" srcId="{EE389596-78F7-48D1-89CB-7F16954A729C}" destId="{2995DC13-CA99-4483-B607-980094DDFFF1}" srcOrd="2" destOrd="0" presId="urn:microsoft.com/office/officeart/2005/8/layout/hList7"/>
     <dgm:cxn modelId="{F504BF1D-2EB4-494C-B71A-B00DBEA05CE7}" type="presParOf" srcId="{EE389596-78F7-48D1-89CB-7F16954A729C}" destId="{C101629B-77BE-427B-8A7D-0B2558F347C2}" srcOrd="3" destOrd="0" presId="urn:microsoft.com/office/officeart/2005/8/layout/hList7"/>
+  </dgm:cxnLst>
+  <dgm:bg/>
+  <dgm:whole/>
+  <dgm:extLst>
+    <a:ext uri="http://schemas.microsoft.com/office/drawing/2008/diagram">
+      <dsp:dataModelExt xmlns:dsp="http://schemas.microsoft.com/office/drawing/2008/diagram" relId="rId6" minVer="http://schemas.openxmlformats.org/drawingml/2006/diagram"/>
+    </a:ext>
+  </dgm:extLst>
+</dgm:dataModel>
+</file>
+
+<file path=ppt/diagrams/data2.xml><?xml version="1.0" encoding="utf-8"?>
+<dgm:dataModel xmlns:dgm="http://schemas.openxmlformats.org/drawingml/2006/diagram" xmlns:a="http://schemas.openxmlformats.org/drawingml/2006/main">
+  <dgm:ptLst>
+    <dgm:pt modelId="{B1CB207B-ED43-49F7-8646-09437A28BFD3}" type="doc">
+      <dgm:prSet loTypeId="urn:microsoft.com/office/officeart/2005/8/layout/hProcess11" loCatId="process" qsTypeId="urn:microsoft.com/office/officeart/2005/8/quickstyle/simple1" qsCatId="simple" csTypeId="urn:microsoft.com/office/officeart/2005/8/colors/accent1_2" csCatId="accent1" phldr="1"/>
+      <dgm:spPr/>
+    </dgm:pt>
+    <dgm:pt modelId="{815A21B8-640D-4A0A-BC78-F13870CC4C58}">
+      <dgm:prSet phldrT="[Text]"/>
+      <dgm:spPr/>
+      <dgm:t>
+        <a:bodyPr/>
+        <a:lstStyle/>
+        <a:p>
+          <a:r>
+            <a:rPr lang="de-DE" dirty="0"/>
+            <a:t>Installation</a:t>
+          </a:r>
+        </a:p>
+      </dgm:t>
+    </dgm:pt>
+    <dgm:pt modelId="{40453BC7-EB7C-4082-95FB-112614683AF0}" type="parTrans" cxnId="{D0A66397-A4E8-47AE-B082-4CE0854D771F}">
+      <dgm:prSet/>
+      <dgm:spPr/>
+      <dgm:t>
+        <a:bodyPr/>
+        <a:lstStyle/>
+        <a:p>
+          <a:endParaRPr lang="de-DE"/>
+        </a:p>
+      </dgm:t>
+    </dgm:pt>
+    <dgm:pt modelId="{EE7E3CC6-FDFF-4E54-BD08-AADE9FC6EE6D}" type="sibTrans" cxnId="{D0A66397-A4E8-47AE-B082-4CE0854D771F}">
+      <dgm:prSet/>
+      <dgm:spPr/>
+      <dgm:t>
+        <a:bodyPr/>
+        <a:lstStyle/>
+        <a:p>
+          <a:endParaRPr lang="de-DE"/>
+        </a:p>
+      </dgm:t>
+    </dgm:pt>
+    <dgm:pt modelId="{D7BC0203-36C7-4DE6-8BF5-40F3B353FD4A}">
+      <dgm:prSet phldrT="[Text]"/>
+      <dgm:spPr/>
+      <dgm:t>
+        <a:bodyPr/>
+        <a:lstStyle/>
+        <a:p>
+          <a:r>
+            <a:rPr lang="de-DE" dirty="0"/>
+            <a:t>Schulungen</a:t>
+          </a:r>
+        </a:p>
+      </dgm:t>
+    </dgm:pt>
+    <dgm:pt modelId="{810E7E01-08B9-46A7-8B18-DDDEC6A45D84}" type="parTrans" cxnId="{FAD5DECB-4542-4C0A-AB64-3B29025A7A2A}">
+      <dgm:prSet/>
+      <dgm:spPr/>
+      <dgm:t>
+        <a:bodyPr/>
+        <a:lstStyle/>
+        <a:p>
+          <a:endParaRPr lang="de-DE"/>
+        </a:p>
+      </dgm:t>
+    </dgm:pt>
+    <dgm:pt modelId="{9465941B-1770-4CAD-B021-1E0C4484A611}" type="sibTrans" cxnId="{FAD5DECB-4542-4C0A-AB64-3B29025A7A2A}">
+      <dgm:prSet/>
+      <dgm:spPr/>
+      <dgm:t>
+        <a:bodyPr/>
+        <a:lstStyle/>
+        <a:p>
+          <a:endParaRPr lang="de-DE"/>
+        </a:p>
+      </dgm:t>
+    </dgm:pt>
+    <dgm:pt modelId="{D7DC21AD-EF37-4265-A5AF-B48B72C7E8DA}">
+      <dgm:prSet phldrT="[Text]"/>
+      <dgm:spPr/>
+      <dgm:t>
+        <a:bodyPr/>
+        <a:lstStyle/>
+        <a:p>
+          <a:r>
+            <a:rPr lang="de-DE" dirty="0"/>
+            <a:t>Übergabe</a:t>
+          </a:r>
+        </a:p>
+      </dgm:t>
+    </dgm:pt>
+    <dgm:pt modelId="{497F29B5-5765-4A05-9779-9E7ACB4B4944}" type="parTrans" cxnId="{98ACD968-1EA2-4056-A8E6-D628D9EE11BB}">
+      <dgm:prSet/>
+      <dgm:spPr/>
+      <dgm:t>
+        <a:bodyPr/>
+        <a:lstStyle/>
+        <a:p>
+          <a:endParaRPr lang="de-DE"/>
+        </a:p>
+      </dgm:t>
+    </dgm:pt>
+    <dgm:pt modelId="{400AE08C-FA4A-4A0A-A9B2-A1059CC6BBD0}" type="sibTrans" cxnId="{98ACD968-1EA2-4056-A8E6-D628D9EE11BB}">
+      <dgm:prSet/>
+      <dgm:spPr/>
+      <dgm:t>
+        <a:bodyPr/>
+        <a:lstStyle/>
+        <a:p>
+          <a:endParaRPr lang="de-DE"/>
+        </a:p>
+      </dgm:t>
+    </dgm:pt>
+    <dgm:pt modelId="{9B4235FE-547D-4207-B6FB-769FBD55BF91}">
+      <dgm:prSet phldrT="[Text]"/>
+      <dgm:spPr/>
+      <dgm:t>
+        <a:bodyPr/>
+        <a:lstStyle/>
+        <a:p>
+          <a:r>
+            <a:rPr lang="de-DE" dirty="0"/>
+            <a:t>Hilfestellung oder Übernahme</a:t>
+          </a:r>
+        </a:p>
+      </dgm:t>
+    </dgm:pt>
+    <dgm:pt modelId="{E1F415FB-3116-4AB5-B6A8-983B83A74C9C}" type="parTrans" cxnId="{BC641DC6-10A6-4BDE-8F38-04655B94759C}">
+      <dgm:prSet/>
+      <dgm:spPr/>
+      <dgm:t>
+        <a:bodyPr/>
+        <a:lstStyle/>
+        <a:p>
+          <a:endParaRPr lang="de-DE"/>
+        </a:p>
+      </dgm:t>
+    </dgm:pt>
+    <dgm:pt modelId="{5D274C2C-D0CB-4E84-87BA-97D0E2DDEE88}" type="sibTrans" cxnId="{BC641DC6-10A6-4BDE-8F38-04655B94759C}">
+      <dgm:prSet/>
+      <dgm:spPr/>
+      <dgm:t>
+        <a:bodyPr/>
+        <a:lstStyle/>
+        <a:p>
+          <a:endParaRPr lang="de-DE"/>
+        </a:p>
+      </dgm:t>
+    </dgm:pt>
+    <dgm:pt modelId="{91A2BC8A-D18B-4FBB-85A8-FBC66D617FC1}">
+      <dgm:prSet phldrT="[Text]"/>
+      <dgm:spPr/>
+      <dgm:t>
+        <a:bodyPr/>
+        <a:lstStyle/>
+        <a:p>
+          <a:r>
+            <a:rPr lang="de-DE" dirty="0"/>
+            <a:t>Auswahl zwischen Rollen oder das gesamte Paket</a:t>
+          </a:r>
+        </a:p>
+      </dgm:t>
+    </dgm:pt>
+    <dgm:pt modelId="{FCDF0223-2E62-49D5-A3AF-C8DE6D0DEA6C}" type="parTrans" cxnId="{676862FA-0B26-4BB6-A37D-D9B59132449F}">
+      <dgm:prSet/>
+      <dgm:spPr/>
+      <dgm:t>
+        <a:bodyPr/>
+        <a:lstStyle/>
+        <a:p>
+          <a:endParaRPr lang="de-DE"/>
+        </a:p>
+      </dgm:t>
+    </dgm:pt>
+    <dgm:pt modelId="{93D0D9B6-3E5A-4018-A87C-C5EA0D0DAE8C}" type="sibTrans" cxnId="{676862FA-0B26-4BB6-A37D-D9B59132449F}">
+      <dgm:prSet/>
+      <dgm:spPr/>
+      <dgm:t>
+        <a:bodyPr/>
+        <a:lstStyle/>
+        <a:p>
+          <a:endParaRPr lang="de-DE"/>
+        </a:p>
+      </dgm:t>
+    </dgm:pt>
+    <dgm:pt modelId="{A74733F0-A6D6-4A27-B17C-2BCDBB4E7125}">
+      <dgm:prSet phldrT="[Text]"/>
+      <dgm:spPr/>
+      <dgm:t>
+        <a:bodyPr/>
+        <a:lstStyle/>
+        <a:p>
+          <a:endParaRPr lang="de-DE" dirty="0"/>
+        </a:p>
+      </dgm:t>
+    </dgm:pt>
+    <dgm:pt modelId="{AFBE64FA-F8B7-46EA-A3DE-9BC928FFBA99}" type="parTrans" cxnId="{F332AC72-8021-439A-898B-7C924A996816}">
+      <dgm:prSet/>
+      <dgm:spPr/>
+      <dgm:t>
+        <a:bodyPr/>
+        <a:lstStyle/>
+        <a:p>
+          <a:endParaRPr lang="de-DE"/>
+        </a:p>
+      </dgm:t>
+    </dgm:pt>
+    <dgm:pt modelId="{F4C9EF69-3A5E-476A-B6DB-3BE6CB8509BE}" type="sibTrans" cxnId="{F332AC72-8021-439A-898B-7C924A996816}">
+      <dgm:prSet/>
+      <dgm:spPr/>
+      <dgm:t>
+        <a:bodyPr/>
+        <a:lstStyle/>
+        <a:p>
+          <a:endParaRPr lang="de-DE"/>
+        </a:p>
+      </dgm:t>
+    </dgm:pt>
+    <dgm:pt modelId="{5436FE52-B580-4CCC-A889-4389734F603E}" type="pres">
+      <dgm:prSet presAssocID="{B1CB207B-ED43-49F7-8646-09437A28BFD3}" presName="Name0" presStyleCnt="0">
+        <dgm:presLayoutVars>
+          <dgm:dir/>
+          <dgm:resizeHandles val="exact"/>
+        </dgm:presLayoutVars>
+      </dgm:prSet>
+      <dgm:spPr/>
+    </dgm:pt>
+    <dgm:pt modelId="{E8F7AE98-E4E2-4DA4-AAA2-27F9F7AFAC06}" type="pres">
+      <dgm:prSet presAssocID="{B1CB207B-ED43-49F7-8646-09437A28BFD3}" presName="arrow" presStyleLbl="bgShp" presStyleIdx="0" presStyleCnt="1"/>
+      <dgm:spPr/>
+    </dgm:pt>
+    <dgm:pt modelId="{4D07F50E-4C58-4425-AEF5-5D1531261923}" type="pres">
+      <dgm:prSet presAssocID="{B1CB207B-ED43-49F7-8646-09437A28BFD3}" presName="points" presStyleCnt="0"/>
+      <dgm:spPr/>
+    </dgm:pt>
+    <dgm:pt modelId="{7AA4F80D-D0A2-4B86-A436-095570C269BD}" type="pres">
+      <dgm:prSet presAssocID="{815A21B8-640D-4A0A-BC78-F13870CC4C58}" presName="compositeA" presStyleCnt="0"/>
+      <dgm:spPr/>
+    </dgm:pt>
+    <dgm:pt modelId="{49F30A8E-04CD-4A7B-9042-6E44AD95CE10}" type="pres">
+      <dgm:prSet presAssocID="{815A21B8-640D-4A0A-BC78-F13870CC4C58}" presName="textA" presStyleLbl="revTx" presStyleIdx="0" presStyleCnt="3">
+        <dgm:presLayoutVars>
+          <dgm:bulletEnabled val="1"/>
+        </dgm:presLayoutVars>
+      </dgm:prSet>
+      <dgm:spPr/>
+    </dgm:pt>
+    <dgm:pt modelId="{DA099EED-4F5D-4058-929B-91D547FCECAF}" type="pres">
+      <dgm:prSet presAssocID="{815A21B8-640D-4A0A-BC78-F13870CC4C58}" presName="circleA" presStyleLbl="node1" presStyleIdx="0" presStyleCnt="3"/>
+      <dgm:spPr/>
+    </dgm:pt>
+    <dgm:pt modelId="{E18CED91-5697-449E-85AD-E37857959432}" type="pres">
+      <dgm:prSet presAssocID="{815A21B8-640D-4A0A-BC78-F13870CC4C58}" presName="spaceA" presStyleCnt="0"/>
+      <dgm:spPr/>
+    </dgm:pt>
+    <dgm:pt modelId="{C0C0EA1D-5C73-4EEA-BA33-E9EFC518C9AF}" type="pres">
+      <dgm:prSet presAssocID="{EE7E3CC6-FDFF-4E54-BD08-AADE9FC6EE6D}" presName="space" presStyleCnt="0"/>
+      <dgm:spPr/>
+    </dgm:pt>
+    <dgm:pt modelId="{4A1ABA37-ACCF-408B-9D2B-7B46CC06D7BC}" type="pres">
+      <dgm:prSet presAssocID="{D7BC0203-36C7-4DE6-8BF5-40F3B353FD4A}" presName="compositeB" presStyleCnt="0"/>
+      <dgm:spPr/>
+    </dgm:pt>
+    <dgm:pt modelId="{A1183B74-D010-4E36-8459-2424B6BFDC1B}" type="pres">
+      <dgm:prSet presAssocID="{D7BC0203-36C7-4DE6-8BF5-40F3B353FD4A}" presName="textB" presStyleLbl="revTx" presStyleIdx="1" presStyleCnt="3">
+        <dgm:presLayoutVars>
+          <dgm:bulletEnabled val="1"/>
+        </dgm:presLayoutVars>
+      </dgm:prSet>
+      <dgm:spPr/>
+    </dgm:pt>
+    <dgm:pt modelId="{77162A5F-071C-48C6-B77C-972F8D3E479B}" type="pres">
+      <dgm:prSet presAssocID="{D7BC0203-36C7-4DE6-8BF5-40F3B353FD4A}" presName="circleB" presStyleLbl="node1" presStyleIdx="1" presStyleCnt="3"/>
+      <dgm:spPr/>
+    </dgm:pt>
+    <dgm:pt modelId="{37AA6817-ECB5-41D8-B4E1-0AD00474BFBA}" type="pres">
+      <dgm:prSet presAssocID="{D7BC0203-36C7-4DE6-8BF5-40F3B353FD4A}" presName="spaceB" presStyleCnt="0"/>
+      <dgm:spPr/>
+    </dgm:pt>
+    <dgm:pt modelId="{25AF18BD-2639-451C-B8E8-D5A12A345BD7}" type="pres">
+      <dgm:prSet presAssocID="{9465941B-1770-4CAD-B021-1E0C4484A611}" presName="space" presStyleCnt="0"/>
+      <dgm:spPr/>
+    </dgm:pt>
+    <dgm:pt modelId="{E136121A-6876-49EB-AC60-F8B6BBE2D26E}" type="pres">
+      <dgm:prSet presAssocID="{D7DC21AD-EF37-4265-A5AF-B48B72C7E8DA}" presName="compositeA" presStyleCnt="0"/>
+      <dgm:spPr/>
+    </dgm:pt>
+    <dgm:pt modelId="{EB925FBC-D2CC-449F-A87C-7D323254B875}" type="pres">
+      <dgm:prSet presAssocID="{D7DC21AD-EF37-4265-A5AF-B48B72C7E8DA}" presName="textA" presStyleLbl="revTx" presStyleIdx="2" presStyleCnt="3">
+        <dgm:presLayoutVars>
+          <dgm:bulletEnabled val="1"/>
+        </dgm:presLayoutVars>
+      </dgm:prSet>
+      <dgm:spPr/>
+    </dgm:pt>
+    <dgm:pt modelId="{24D016FC-27A0-40B2-81C4-613E6EA1A617}" type="pres">
+      <dgm:prSet presAssocID="{D7DC21AD-EF37-4265-A5AF-B48B72C7E8DA}" presName="circleA" presStyleLbl="node1" presStyleIdx="2" presStyleCnt="3"/>
+      <dgm:spPr/>
+    </dgm:pt>
+    <dgm:pt modelId="{D994B3D8-003D-4F6D-871D-89DF892C7FE5}" type="pres">
+      <dgm:prSet presAssocID="{D7DC21AD-EF37-4265-A5AF-B48B72C7E8DA}" presName="spaceA" presStyleCnt="0"/>
+      <dgm:spPr/>
+    </dgm:pt>
+  </dgm:ptLst>
+  <dgm:cxnLst>
+    <dgm:cxn modelId="{98ACD968-1EA2-4056-A8E6-D628D9EE11BB}" srcId="{B1CB207B-ED43-49F7-8646-09437A28BFD3}" destId="{D7DC21AD-EF37-4265-A5AF-B48B72C7E8DA}" srcOrd="2" destOrd="0" parTransId="{497F29B5-5765-4A05-9779-9E7ACB4B4944}" sibTransId="{400AE08C-FA4A-4A0A-A9B2-A1059CC6BBD0}"/>
+    <dgm:cxn modelId="{9E35999C-1359-4BA5-B7DF-8F76D09F4E31}" type="presOf" srcId="{91A2BC8A-D18B-4FBB-85A8-FBC66D617FC1}" destId="{A1183B74-D010-4E36-8459-2424B6BFDC1B}" srcOrd="0" destOrd="1" presId="urn:microsoft.com/office/officeart/2005/8/layout/hProcess11"/>
+    <dgm:cxn modelId="{F332AC72-8021-439A-898B-7C924A996816}" srcId="{D7DC21AD-EF37-4265-A5AF-B48B72C7E8DA}" destId="{A74733F0-A6D6-4A27-B17C-2BCDBB4E7125}" srcOrd="0" destOrd="0" parTransId="{AFBE64FA-F8B7-46EA-A3DE-9BC928FFBA99}" sibTransId="{F4C9EF69-3A5E-476A-B6DB-3BE6CB8509BE}"/>
+    <dgm:cxn modelId="{7E5DA9FC-3CA8-4C7D-A718-F87D4EFD3CD6}" type="presOf" srcId="{D7BC0203-36C7-4DE6-8BF5-40F3B353FD4A}" destId="{A1183B74-D010-4E36-8459-2424B6BFDC1B}" srcOrd="0" destOrd="0" presId="urn:microsoft.com/office/officeart/2005/8/layout/hProcess11"/>
+    <dgm:cxn modelId="{DB43C3A8-4FC3-4740-BBE5-7E7B4F19343F}" type="presOf" srcId="{815A21B8-640D-4A0A-BC78-F13870CC4C58}" destId="{49F30A8E-04CD-4A7B-9042-6E44AD95CE10}" srcOrd="0" destOrd="0" presId="urn:microsoft.com/office/officeart/2005/8/layout/hProcess11"/>
+    <dgm:cxn modelId="{BC641DC6-10A6-4BDE-8F38-04655B94759C}" srcId="{815A21B8-640D-4A0A-BC78-F13870CC4C58}" destId="{9B4235FE-547D-4207-B6FB-769FBD55BF91}" srcOrd="0" destOrd="0" parTransId="{E1F415FB-3116-4AB5-B6A8-983B83A74C9C}" sibTransId="{5D274C2C-D0CB-4E84-87BA-97D0E2DDEE88}"/>
+    <dgm:cxn modelId="{D2846FC3-00FF-4935-A1B4-3E377D65DF48}" type="presOf" srcId="{9B4235FE-547D-4207-B6FB-769FBD55BF91}" destId="{49F30A8E-04CD-4A7B-9042-6E44AD95CE10}" srcOrd="0" destOrd="1" presId="urn:microsoft.com/office/officeart/2005/8/layout/hProcess11"/>
+    <dgm:cxn modelId="{D0A66397-A4E8-47AE-B082-4CE0854D771F}" srcId="{B1CB207B-ED43-49F7-8646-09437A28BFD3}" destId="{815A21B8-640D-4A0A-BC78-F13870CC4C58}" srcOrd="0" destOrd="0" parTransId="{40453BC7-EB7C-4082-95FB-112614683AF0}" sibTransId="{EE7E3CC6-FDFF-4E54-BD08-AADE9FC6EE6D}"/>
+    <dgm:cxn modelId="{FAD5DECB-4542-4C0A-AB64-3B29025A7A2A}" srcId="{B1CB207B-ED43-49F7-8646-09437A28BFD3}" destId="{D7BC0203-36C7-4DE6-8BF5-40F3B353FD4A}" srcOrd="1" destOrd="0" parTransId="{810E7E01-08B9-46A7-8B18-DDDEC6A45D84}" sibTransId="{9465941B-1770-4CAD-B021-1E0C4484A611}"/>
+    <dgm:cxn modelId="{F68BD0E1-01A4-41D9-8386-56AC4E7737D6}" type="presOf" srcId="{A74733F0-A6D6-4A27-B17C-2BCDBB4E7125}" destId="{EB925FBC-D2CC-449F-A87C-7D323254B875}" srcOrd="0" destOrd="1" presId="urn:microsoft.com/office/officeart/2005/8/layout/hProcess11"/>
+    <dgm:cxn modelId="{80E1638C-50AF-4C7B-925A-B21FB1A3887D}" type="presOf" srcId="{D7DC21AD-EF37-4265-A5AF-B48B72C7E8DA}" destId="{EB925FBC-D2CC-449F-A87C-7D323254B875}" srcOrd="0" destOrd="0" presId="urn:microsoft.com/office/officeart/2005/8/layout/hProcess11"/>
+    <dgm:cxn modelId="{676862FA-0B26-4BB6-A37D-D9B59132449F}" srcId="{D7BC0203-36C7-4DE6-8BF5-40F3B353FD4A}" destId="{91A2BC8A-D18B-4FBB-85A8-FBC66D617FC1}" srcOrd="0" destOrd="0" parTransId="{FCDF0223-2E62-49D5-A3AF-C8DE6D0DEA6C}" sibTransId="{93D0D9B6-3E5A-4018-A87C-C5EA0D0DAE8C}"/>
+    <dgm:cxn modelId="{1280B5F2-3124-42D9-9D70-7BAC6266C972}" type="presOf" srcId="{B1CB207B-ED43-49F7-8646-09437A28BFD3}" destId="{5436FE52-B580-4CCC-A889-4389734F603E}" srcOrd="0" destOrd="0" presId="urn:microsoft.com/office/officeart/2005/8/layout/hProcess11"/>
+    <dgm:cxn modelId="{CD94A9DE-FE38-4788-AF25-A5DFE53332C7}" type="presParOf" srcId="{5436FE52-B580-4CCC-A889-4389734F603E}" destId="{E8F7AE98-E4E2-4DA4-AAA2-27F9F7AFAC06}" srcOrd="0" destOrd="0" presId="urn:microsoft.com/office/officeart/2005/8/layout/hProcess11"/>
+    <dgm:cxn modelId="{50E4625F-F746-4BDA-A97D-55CF15A53BA7}" type="presParOf" srcId="{5436FE52-B580-4CCC-A889-4389734F603E}" destId="{4D07F50E-4C58-4425-AEF5-5D1531261923}" srcOrd="1" destOrd="0" presId="urn:microsoft.com/office/officeart/2005/8/layout/hProcess11"/>
+    <dgm:cxn modelId="{85034E25-2D48-4340-906E-9E309CF0AF23}" type="presParOf" srcId="{4D07F50E-4C58-4425-AEF5-5D1531261923}" destId="{7AA4F80D-D0A2-4B86-A436-095570C269BD}" srcOrd="0" destOrd="0" presId="urn:microsoft.com/office/officeart/2005/8/layout/hProcess11"/>
+    <dgm:cxn modelId="{8184AC27-DF80-4369-BB4B-37C2FF101C4F}" type="presParOf" srcId="{7AA4F80D-D0A2-4B86-A436-095570C269BD}" destId="{49F30A8E-04CD-4A7B-9042-6E44AD95CE10}" srcOrd="0" destOrd="0" presId="urn:microsoft.com/office/officeart/2005/8/layout/hProcess11"/>
+    <dgm:cxn modelId="{1A2744B6-4D11-4F92-9928-DDB4B4C67D5F}" type="presParOf" srcId="{7AA4F80D-D0A2-4B86-A436-095570C269BD}" destId="{DA099EED-4F5D-4058-929B-91D547FCECAF}" srcOrd="1" destOrd="0" presId="urn:microsoft.com/office/officeart/2005/8/layout/hProcess11"/>
+    <dgm:cxn modelId="{CAE8754A-A733-4172-B12D-E5413F2A8E2D}" type="presParOf" srcId="{7AA4F80D-D0A2-4B86-A436-095570C269BD}" destId="{E18CED91-5697-449E-85AD-E37857959432}" srcOrd="2" destOrd="0" presId="urn:microsoft.com/office/officeart/2005/8/layout/hProcess11"/>
+    <dgm:cxn modelId="{56C4655D-72C6-47E9-8F7B-B3B457948427}" type="presParOf" srcId="{4D07F50E-4C58-4425-AEF5-5D1531261923}" destId="{C0C0EA1D-5C73-4EEA-BA33-E9EFC518C9AF}" srcOrd="1" destOrd="0" presId="urn:microsoft.com/office/officeart/2005/8/layout/hProcess11"/>
+    <dgm:cxn modelId="{5D31DD39-492E-4471-9C16-E79D67F2928C}" type="presParOf" srcId="{4D07F50E-4C58-4425-AEF5-5D1531261923}" destId="{4A1ABA37-ACCF-408B-9D2B-7B46CC06D7BC}" srcOrd="2" destOrd="0" presId="urn:microsoft.com/office/officeart/2005/8/layout/hProcess11"/>
+    <dgm:cxn modelId="{AFF12A30-18F2-4A65-B8EE-FD2F97EC0152}" type="presParOf" srcId="{4A1ABA37-ACCF-408B-9D2B-7B46CC06D7BC}" destId="{A1183B74-D010-4E36-8459-2424B6BFDC1B}" srcOrd="0" destOrd="0" presId="urn:microsoft.com/office/officeart/2005/8/layout/hProcess11"/>
+    <dgm:cxn modelId="{D09D2B18-D024-4964-9FBA-99318A26F545}" type="presParOf" srcId="{4A1ABA37-ACCF-408B-9D2B-7B46CC06D7BC}" destId="{77162A5F-071C-48C6-B77C-972F8D3E479B}" srcOrd="1" destOrd="0" presId="urn:microsoft.com/office/officeart/2005/8/layout/hProcess11"/>
+    <dgm:cxn modelId="{314C264E-5A50-4DE8-BD62-DB31ED91D59D}" type="presParOf" srcId="{4A1ABA37-ACCF-408B-9D2B-7B46CC06D7BC}" destId="{37AA6817-ECB5-41D8-B4E1-0AD00474BFBA}" srcOrd="2" destOrd="0" presId="urn:microsoft.com/office/officeart/2005/8/layout/hProcess11"/>
+    <dgm:cxn modelId="{806E07FC-92B4-49B1-B91C-9285047AEC91}" type="presParOf" srcId="{4D07F50E-4C58-4425-AEF5-5D1531261923}" destId="{25AF18BD-2639-451C-B8E8-D5A12A345BD7}" srcOrd="3" destOrd="0" presId="urn:microsoft.com/office/officeart/2005/8/layout/hProcess11"/>
+    <dgm:cxn modelId="{39D234C6-0FDE-4DD4-B69B-5EA32E4C3633}" type="presParOf" srcId="{4D07F50E-4C58-4425-AEF5-5D1531261923}" destId="{E136121A-6876-49EB-AC60-F8B6BBE2D26E}" srcOrd="4" destOrd="0" presId="urn:microsoft.com/office/officeart/2005/8/layout/hProcess11"/>
+    <dgm:cxn modelId="{C7EAAEBA-4181-4C7E-AE1F-389AB79FF459}" type="presParOf" srcId="{E136121A-6876-49EB-AC60-F8B6BBE2D26E}" destId="{EB925FBC-D2CC-449F-A87C-7D323254B875}" srcOrd="0" destOrd="0" presId="urn:microsoft.com/office/officeart/2005/8/layout/hProcess11"/>
+    <dgm:cxn modelId="{F7E2D79E-BCDD-4951-B7D0-7A7F8B270133}" type="presParOf" srcId="{E136121A-6876-49EB-AC60-F8B6BBE2D26E}" destId="{24D016FC-27A0-40B2-81C4-613E6EA1A617}" srcOrd="1" destOrd="0" presId="urn:microsoft.com/office/officeart/2005/8/layout/hProcess11"/>
+    <dgm:cxn modelId="{E17A33C4-C408-4B11-A676-EDF40C86270C}" type="presParOf" srcId="{E136121A-6876-49EB-AC60-F8B6BBE2D26E}" destId="{D994B3D8-003D-4F6D-871D-89DF892C7FE5}" srcOrd="2" destOrd="0" presId="urn:microsoft.com/office/officeart/2005/8/layout/hProcess11"/>
   </dgm:cxnLst>
   <dgm:bg/>
   <dgm:whole/>
@@ -2069,6 +3167,439 @@
 </dsp:drawing>
 </file>
 
+<file path=ppt/diagrams/drawing2.xml><?xml version="1.0" encoding="utf-8"?>
+<dsp:drawing xmlns:dgm="http://schemas.openxmlformats.org/drawingml/2006/diagram" xmlns:dsp="http://schemas.microsoft.com/office/drawing/2008/diagram" xmlns:a="http://schemas.openxmlformats.org/drawingml/2006/main">
+  <dsp:spTree>
+    <dsp:nvGrpSpPr>
+      <dsp:cNvPr id="0" name=""/>
+      <dsp:cNvGrpSpPr/>
+    </dsp:nvGrpSpPr>
+    <dsp:grpSpPr/>
+    <dsp:sp modelId="{E8F7AE98-E4E2-4DA4-AAA2-27F9F7AFAC06}">
+      <dsp:nvSpPr>
+        <dsp:cNvPr id="0" name=""/>
+        <dsp:cNvSpPr/>
+      </dsp:nvSpPr>
+      <dsp:spPr>
+        <a:xfrm>
+          <a:off x="0" y="1305401"/>
+          <a:ext cx="10515600" cy="1740535"/>
+        </a:xfrm>
+        <a:prstGeom prst="notchedRightArrow">
+          <a:avLst/>
+        </a:prstGeom>
+        <a:solidFill>
+          <a:schemeClr val="accent1">
+            <a:tint val="40000"/>
+            <a:hueOff val="0"/>
+            <a:satOff val="0"/>
+            <a:lumOff val="0"/>
+            <a:alphaOff val="0"/>
+          </a:schemeClr>
+        </a:solidFill>
+        <a:ln>
+          <a:noFill/>
+        </a:ln>
+        <a:effectLst/>
+      </dsp:spPr>
+      <dsp:style>
+        <a:lnRef idx="0">
+          <a:scrgbClr r="0" g="0" b="0"/>
+        </a:lnRef>
+        <a:fillRef idx="1">
+          <a:scrgbClr r="0" g="0" b="0"/>
+        </a:fillRef>
+        <a:effectRef idx="0">
+          <a:scrgbClr r="0" g="0" b="0"/>
+        </a:effectRef>
+        <a:fontRef idx="minor"/>
+      </dsp:style>
+    </dsp:sp>
+    <dsp:sp modelId="{49F30A8E-04CD-4A7B-9042-6E44AD95CE10}">
+      <dsp:nvSpPr>
+        <dsp:cNvPr id="0" name=""/>
+        <dsp:cNvSpPr/>
+      </dsp:nvSpPr>
+      <dsp:spPr>
+        <a:xfrm>
+          <a:off x="4621" y="0"/>
+          <a:ext cx="3049934" cy="1740535"/>
+        </a:xfrm>
+        <a:prstGeom prst="rect">
+          <a:avLst/>
+        </a:prstGeom>
+        <a:noFill/>
+        <a:ln>
+          <a:noFill/>
+        </a:ln>
+        <a:effectLst/>
+      </dsp:spPr>
+      <dsp:style>
+        <a:lnRef idx="0">
+          <a:scrgbClr r="0" g="0" b="0"/>
+        </a:lnRef>
+        <a:fillRef idx="0">
+          <a:scrgbClr r="0" g="0" b="0"/>
+        </a:fillRef>
+        <a:effectRef idx="0">
+          <a:scrgbClr r="0" g="0" b="0"/>
+        </a:effectRef>
+        <a:fontRef idx="minor"/>
+      </dsp:style>
+      <dsp:txBody>
+        <a:bodyPr spcFirstLastPara="0" vert="horz" wrap="square" lIns="184912" tIns="184912" rIns="184912" bIns="184912" numCol="1" spcCol="1270" anchor="b" anchorCtr="1">
+          <a:noAutofit/>
+        </a:bodyPr>
+        <a:lstStyle/>
+        <a:p>
+          <a:pPr marL="0" lvl="0" indent="0" algn="l" defTabSz="1155700">
+            <a:lnSpc>
+              <a:spcPct val="90000"/>
+            </a:lnSpc>
+            <a:spcBef>
+              <a:spcPct val="0"/>
+            </a:spcBef>
+            <a:spcAft>
+              <a:spcPct val="35000"/>
+            </a:spcAft>
+            <a:buNone/>
+          </a:pPr>
+          <a:r>
+            <a:rPr lang="de-DE" sz="2600" kern="1200" dirty="0"/>
+            <a:t>Installation</a:t>
+          </a:r>
+        </a:p>
+        <a:p>
+          <a:pPr marL="228600" lvl="1" indent="-228600" algn="l" defTabSz="889000">
+            <a:lnSpc>
+              <a:spcPct val="90000"/>
+            </a:lnSpc>
+            <a:spcBef>
+              <a:spcPct val="0"/>
+            </a:spcBef>
+            <a:spcAft>
+              <a:spcPct val="15000"/>
+            </a:spcAft>
+            <a:buChar char="•"/>
+          </a:pPr>
+          <a:r>
+            <a:rPr lang="de-DE" sz="2000" kern="1200" dirty="0"/>
+            <a:t>Hilfestellung oder Übernahme</a:t>
+          </a:r>
+        </a:p>
+      </dsp:txBody>
+      <dsp:txXfrm>
+        <a:off x="4621" y="0"/>
+        <a:ext cx="3049934" cy="1740535"/>
+      </dsp:txXfrm>
+    </dsp:sp>
+    <dsp:sp modelId="{DA099EED-4F5D-4058-929B-91D547FCECAF}">
+      <dsp:nvSpPr>
+        <dsp:cNvPr id="0" name=""/>
+        <dsp:cNvSpPr/>
+      </dsp:nvSpPr>
+      <dsp:spPr>
+        <a:xfrm>
+          <a:off x="1312021" y="1958102"/>
+          <a:ext cx="435133" cy="435133"/>
+        </a:xfrm>
+        <a:prstGeom prst="ellipse">
+          <a:avLst/>
+        </a:prstGeom>
+        <a:solidFill>
+          <a:schemeClr val="accent1">
+            <a:hueOff val="0"/>
+            <a:satOff val="0"/>
+            <a:lumOff val="0"/>
+            <a:alphaOff val="0"/>
+          </a:schemeClr>
+        </a:solidFill>
+        <a:ln w="12700" cap="flat" cmpd="sng" algn="ctr">
+          <a:solidFill>
+            <a:schemeClr val="lt1">
+              <a:hueOff val="0"/>
+              <a:satOff val="0"/>
+              <a:lumOff val="0"/>
+              <a:alphaOff val="0"/>
+            </a:schemeClr>
+          </a:solidFill>
+          <a:prstDash val="solid"/>
+          <a:miter lim="800000"/>
+        </a:ln>
+        <a:effectLst/>
+      </dsp:spPr>
+      <dsp:style>
+        <a:lnRef idx="2">
+          <a:scrgbClr r="0" g="0" b="0"/>
+        </a:lnRef>
+        <a:fillRef idx="1">
+          <a:scrgbClr r="0" g="0" b="0"/>
+        </a:fillRef>
+        <a:effectRef idx="0">
+          <a:scrgbClr r="0" g="0" b="0"/>
+        </a:effectRef>
+        <a:fontRef idx="minor">
+          <a:schemeClr val="lt1"/>
+        </a:fontRef>
+      </dsp:style>
+    </dsp:sp>
+    <dsp:sp modelId="{A1183B74-D010-4E36-8459-2424B6BFDC1B}">
+      <dsp:nvSpPr>
+        <dsp:cNvPr id="0" name=""/>
+        <dsp:cNvSpPr/>
+      </dsp:nvSpPr>
+      <dsp:spPr>
+        <a:xfrm>
+          <a:off x="3207052" y="2610802"/>
+          <a:ext cx="3049934" cy="1740535"/>
+        </a:xfrm>
+        <a:prstGeom prst="rect">
+          <a:avLst/>
+        </a:prstGeom>
+        <a:noFill/>
+        <a:ln>
+          <a:noFill/>
+        </a:ln>
+        <a:effectLst/>
+      </dsp:spPr>
+      <dsp:style>
+        <a:lnRef idx="0">
+          <a:scrgbClr r="0" g="0" b="0"/>
+        </a:lnRef>
+        <a:fillRef idx="0">
+          <a:scrgbClr r="0" g="0" b="0"/>
+        </a:fillRef>
+        <a:effectRef idx="0">
+          <a:scrgbClr r="0" g="0" b="0"/>
+        </a:effectRef>
+        <a:fontRef idx="minor"/>
+      </dsp:style>
+      <dsp:txBody>
+        <a:bodyPr spcFirstLastPara="0" vert="horz" wrap="square" lIns="184912" tIns="184912" rIns="184912" bIns="184912" numCol="1" spcCol="1270" anchor="t" anchorCtr="1">
+          <a:noAutofit/>
+        </a:bodyPr>
+        <a:lstStyle/>
+        <a:p>
+          <a:pPr marL="0" lvl="0" indent="0" algn="l" defTabSz="1155700">
+            <a:lnSpc>
+              <a:spcPct val="90000"/>
+            </a:lnSpc>
+            <a:spcBef>
+              <a:spcPct val="0"/>
+            </a:spcBef>
+            <a:spcAft>
+              <a:spcPct val="35000"/>
+            </a:spcAft>
+            <a:buNone/>
+          </a:pPr>
+          <a:r>
+            <a:rPr lang="de-DE" sz="2600" kern="1200" dirty="0"/>
+            <a:t>Schulungen</a:t>
+          </a:r>
+        </a:p>
+        <a:p>
+          <a:pPr marL="228600" lvl="1" indent="-228600" algn="l" defTabSz="889000">
+            <a:lnSpc>
+              <a:spcPct val="90000"/>
+            </a:lnSpc>
+            <a:spcBef>
+              <a:spcPct val="0"/>
+            </a:spcBef>
+            <a:spcAft>
+              <a:spcPct val="15000"/>
+            </a:spcAft>
+            <a:buChar char="•"/>
+          </a:pPr>
+          <a:r>
+            <a:rPr lang="de-DE" sz="2000" kern="1200" dirty="0"/>
+            <a:t>Auswahl zwischen Rollen oder das gesamte Paket</a:t>
+          </a:r>
+        </a:p>
+      </dsp:txBody>
+      <dsp:txXfrm>
+        <a:off x="3207052" y="2610802"/>
+        <a:ext cx="3049934" cy="1740535"/>
+      </dsp:txXfrm>
+    </dsp:sp>
+    <dsp:sp modelId="{77162A5F-071C-48C6-B77C-972F8D3E479B}">
+      <dsp:nvSpPr>
+        <dsp:cNvPr id="0" name=""/>
+        <dsp:cNvSpPr/>
+      </dsp:nvSpPr>
+      <dsp:spPr>
+        <a:xfrm>
+          <a:off x="4514453" y="1958102"/>
+          <a:ext cx="435133" cy="435133"/>
+        </a:xfrm>
+        <a:prstGeom prst="ellipse">
+          <a:avLst/>
+        </a:prstGeom>
+        <a:solidFill>
+          <a:schemeClr val="accent1">
+            <a:hueOff val="0"/>
+            <a:satOff val="0"/>
+            <a:lumOff val="0"/>
+            <a:alphaOff val="0"/>
+          </a:schemeClr>
+        </a:solidFill>
+        <a:ln w="12700" cap="flat" cmpd="sng" algn="ctr">
+          <a:solidFill>
+            <a:schemeClr val="lt1">
+              <a:hueOff val="0"/>
+              <a:satOff val="0"/>
+              <a:lumOff val="0"/>
+              <a:alphaOff val="0"/>
+            </a:schemeClr>
+          </a:solidFill>
+          <a:prstDash val="solid"/>
+          <a:miter lim="800000"/>
+        </a:ln>
+        <a:effectLst/>
+      </dsp:spPr>
+      <dsp:style>
+        <a:lnRef idx="2">
+          <a:scrgbClr r="0" g="0" b="0"/>
+        </a:lnRef>
+        <a:fillRef idx="1">
+          <a:scrgbClr r="0" g="0" b="0"/>
+        </a:fillRef>
+        <a:effectRef idx="0">
+          <a:scrgbClr r="0" g="0" b="0"/>
+        </a:effectRef>
+        <a:fontRef idx="minor">
+          <a:schemeClr val="lt1"/>
+        </a:fontRef>
+      </dsp:style>
+    </dsp:sp>
+    <dsp:sp modelId="{EB925FBC-D2CC-449F-A87C-7D323254B875}">
+      <dsp:nvSpPr>
+        <dsp:cNvPr id="0" name=""/>
+        <dsp:cNvSpPr/>
+      </dsp:nvSpPr>
+      <dsp:spPr>
+        <a:xfrm>
+          <a:off x="6409484" y="0"/>
+          <a:ext cx="3049934" cy="1740535"/>
+        </a:xfrm>
+        <a:prstGeom prst="rect">
+          <a:avLst/>
+        </a:prstGeom>
+        <a:noFill/>
+        <a:ln>
+          <a:noFill/>
+        </a:ln>
+        <a:effectLst/>
+      </dsp:spPr>
+      <dsp:style>
+        <a:lnRef idx="0">
+          <a:scrgbClr r="0" g="0" b="0"/>
+        </a:lnRef>
+        <a:fillRef idx="0">
+          <a:scrgbClr r="0" g="0" b="0"/>
+        </a:fillRef>
+        <a:effectRef idx="0">
+          <a:scrgbClr r="0" g="0" b="0"/>
+        </a:effectRef>
+        <a:fontRef idx="minor"/>
+      </dsp:style>
+      <dsp:txBody>
+        <a:bodyPr spcFirstLastPara="0" vert="horz" wrap="square" lIns="184912" tIns="184912" rIns="184912" bIns="184912" numCol="1" spcCol="1270" anchor="b" anchorCtr="1">
+          <a:noAutofit/>
+        </a:bodyPr>
+        <a:lstStyle/>
+        <a:p>
+          <a:pPr marL="0" lvl="0" indent="0" algn="l" defTabSz="1155700">
+            <a:lnSpc>
+              <a:spcPct val="90000"/>
+            </a:lnSpc>
+            <a:spcBef>
+              <a:spcPct val="0"/>
+            </a:spcBef>
+            <a:spcAft>
+              <a:spcPct val="35000"/>
+            </a:spcAft>
+            <a:buNone/>
+          </a:pPr>
+          <a:r>
+            <a:rPr lang="de-DE" sz="2600" kern="1200" dirty="0"/>
+            <a:t>Übergabe</a:t>
+          </a:r>
+        </a:p>
+        <a:p>
+          <a:pPr marL="228600" lvl="1" indent="-228600" algn="l" defTabSz="889000">
+            <a:lnSpc>
+              <a:spcPct val="90000"/>
+            </a:lnSpc>
+            <a:spcBef>
+              <a:spcPct val="0"/>
+            </a:spcBef>
+            <a:spcAft>
+              <a:spcPct val="15000"/>
+            </a:spcAft>
+            <a:buChar char="•"/>
+          </a:pPr>
+          <a:endParaRPr lang="de-DE" sz="2000" kern="1200" dirty="0"/>
+        </a:p>
+      </dsp:txBody>
+      <dsp:txXfrm>
+        <a:off x="6409484" y="0"/>
+        <a:ext cx="3049934" cy="1740535"/>
+      </dsp:txXfrm>
+    </dsp:sp>
+    <dsp:sp modelId="{24D016FC-27A0-40B2-81C4-613E6EA1A617}">
+      <dsp:nvSpPr>
+        <dsp:cNvPr id="0" name=""/>
+        <dsp:cNvSpPr/>
+      </dsp:nvSpPr>
+      <dsp:spPr>
+        <a:xfrm>
+          <a:off x="7716884" y="1958102"/>
+          <a:ext cx="435133" cy="435133"/>
+        </a:xfrm>
+        <a:prstGeom prst="ellipse">
+          <a:avLst/>
+        </a:prstGeom>
+        <a:solidFill>
+          <a:schemeClr val="accent1">
+            <a:hueOff val="0"/>
+            <a:satOff val="0"/>
+            <a:lumOff val="0"/>
+            <a:alphaOff val="0"/>
+          </a:schemeClr>
+        </a:solidFill>
+        <a:ln w="12700" cap="flat" cmpd="sng" algn="ctr">
+          <a:solidFill>
+            <a:schemeClr val="lt1">
+              <a:hueOff val="0"/>
+              <a:satOff val="0"/>
+              <a:lumOff val="0"/>
+              <a:alphaOff val="0"/>
+            </a:schemeClr>
+          </a:solidFill>
+          <a:prstDash val="solid"/>
+          <a:miter lim="800000"/>
+        </a:ln>
+        <a:effectLst/>
+      </dsp:spPr>
+      <dsp:style>
+        <a:lnRef idx="2">
+          <a:scrgbClr r="0" g="0" b="0"/>
+        </a:lnRef>
+        <a:fillRef idx="1">
+          <a:scrgbClr r="0" g="0" b="0"/>
+        </a:fillRef>
+        <a:effectRef idx="0">
+          <a:scrgbClr r="0" g="0" b="0"/>
+        </a:effectRef>
+        <a:fontRef idx="minor">
+          <a:schemeClr val="lt1"/>
+        </a:fontRef>
+      </dsp:style>
+    </dsp:sp>
+  </dsp:spTree>
+</dsp:drawing>
+</file>
+
 <file path=ppt/diagrams/layout1.xml><?xml version="1.0" encoding="utf-8"?>
 <dgm:layoutDef xmlns:dgm="http://schemas.openxmlformats.org/drawingml/2006/diagram" xmlns:a="http://schemas.openxmlformats.org/drawingml/2006/main" uniqueId="urn:microsoft.com/office/officeart/2005/8/layout/hList7">
   <dgm:title val=""/>
@@ -2264,7 +3795,1313 @@
 </dgm:layoutDef>
 </file>
 
+<file path=ppt/diagrams/layout2.xml><?xml version="1.0" encoding="utf-8"?>
+<dgm:layoutDef xmlns:dgm="http://schemas.openxmlformats.org/drawingml/2006/diagram" xmlns:a="http://schemas.openxmlformats.org/drawingml/2006/main" uniqueId="urn:microsoft.com/office/officeart/2005/8/layout/hProcess11">
+  <dgm:title val=""/>
+  <dgm:desc val=""/>
+  <dgm:catLst>
+    <dgm:cat type="process" pri="8000"/>
+    <dgm:cat type="convert" pri="14000"/>
+  </dgm:catLst>
+  <dgm:sampData useDef="1">
+    <dgm:dataModel>
+      <dgm:ptLst/>
+      <dgm:bg/>
+      <dgm:whole/>
+    </dgm:dataModel>
+  </dgm:sampData>
+  <dgm:styleData>
+    <dgm:dataModel>
+      <dgm:ptLst>
+        <dgm:pt modelId="0" type="doc"/>
+        <dgm:pt modelId="1"/>
+        <dgm:pt modelId="2"/>
+      </dgm:ptLst>
+      <dgm:cxnLst>
+        <dgm:cxn modelId="4" srcId="0" destId="1" srcOrd="0" destOrd="0"/>
+        <dgm:cxn modelId="5" srcId="0" destId="2" srcOrd="1" destOrd="0"/>
+      </dgm:cxnLst>
+      <dgm:bg/>
+      <dgm:whole/>
+    </dgm:dataModel>
+  </dgm:styleData>
+  <dgm:clrData>
+    <dgm:dataModel>
+      <dgm:ptLst>
+        <dgm:pt modelId="0" type="doc"/>
+        <dgm:pt modelId="1"/>
+        <dgm:pt modelId="2"/>
+        <dgm:pt modelId="3"/>
+        <dgm:pt modelId="4"/>
+      </dgm:ptLst>
+      <dgm:cxnLst>
+        <dgm:cxn modelId="5" srcId="0" destId="1" srcOrd="0" destOrd="0"/>
+        <dgm:cxn modelId="6" srcId="0" destId="2" srcOrd="1" destOrd="0"/>
+        <dgm:cxn modelId="7" srcId="0" destId="3" srcOrd="2" destOrd="0"/>
+        <dgm:cxn modelId="8" srcId="0" destId="4" srcOrd="3" destOrd="0"/>
+      </dgm:cxnLst>
+      <dgm:bg/>
+      <dgm:whole/>
+    </dgm:dataModel>
+  </dgm:clrData>
+  <dgm:layoutNode name="Name0">
+    <dgm:varLst>
+      <dgm:dir/>
+      <dgm:resizeHandles val="exact"/>
+    </dgm:varLst>
+    <dgm:alg type="composite"/>
+    <dgm:shape xmlns:r="http://schemas.openxmlformats.org/officeDocument/2006/relationships" r:blip="">
+      <dgm:adjLst/>
+    </dgm:shape>
+    <dgm:presOf/>
+    <dgm:choose name="Name1">
+      <dgm:if name="Name2" func="var" arg="dir" op="equ" val="norm">
+        <dgm:constrLst>
+          <dgm:constr type="w" for="ch" forName="arrow" refType="w"/>
+          <dgm:constr type="h" for="ch" forName="arrow" refType="h" fact="0.4"/>
+          <dgm:constr type="ctrY" for="ch" forName="arrow" refType="h" fact="0.5"/>
+          <dgm:constr type="l" for="ch" forName="arrow"/>
+          <dgm:constr type="w" for="ch" forName="points" refType="w" fact="0.9"/>
+          <dgm:constr type="h" for="ch" forName="points" refType="h"/>
+          <dgm:constr type="t" for="ch" forName="points"/>
+          <dgm:constr type="l" for="ch" forName="points"/>
+        </dgm:constrLst>
+      </dgm:if>
+      <dgm:else name="Name3">
+        <dgm:constrLst>
+          <dgm:constr type="w" for="ch" forName="arrow" refType="w"/>
+          <dgm:constr type="h" for="ch" forName="arrow" refType="h" fact="0.4"/>
+          <dgm:constr type="ctrY" for="ch" forName="arrow" refType="h" fact="0.5"/>
+          <dgm:constr type="r" for="ch" forName="arrow" refType="w"/>
+          <dgm:constr type="w" for="ch" forName="points" refType="w" fact="0.9"/>
+          <dgm:constr type="h" for="ch" forName="points" refType="h"/>
+          <dgm:constr type="t" for="ch" forName="points"/>
+          <dgm:constr type="r" for="ch" forName="points" refType="w"/>
+        </dgm:constrLst>
+      </dgm:else>
+    </dgm:choose>
+    <dgm:ruleLst/>
+    <dgm:layoutNode name="arrow" styleLbl="bgShp">
+      <dgm:alg type="sp"/>
+      <dgm:choose name="Name4">
+        <dgm:if name="Name5" func="var" arg="dir" op="equ" val="norm">
+          <dgm:shape xmlns:r="http://schemas.openxmlformats.org/officeDocument/2006/relationships" type="notchedRightArrow" r:blip="">
+            <dgm:adjLst/>
+          </dgm:shape>
+        </dgm:if>
+        <dgm:else name="Name6">
+          <dgm:shape xmlns:r="http://schemas.openxmlformats.org/officeDocument/2006/relationships" rot="180" type="notchedRightArrow" r:blip="">
+            <dgm:adjLst/>
+          </dgm:shape>
+        </dgm:else>
+      </dgm:choose>
+      <dgm:presOf/>
+      <dgm:constrLst/>
+      <dgm:ruleLst/>
+    </dgm:layoutNode>
+    <dgm:layoutNode name="points">
+      <dgm:choose name="Name7">
+        <dgm:if name="Name8" func="var" arg="dir" op="equ" val="norm">
+          <dgm:alg type="lin">
+            <dgm:param type="linDir" val="fromL"/>
+          </dgm:alg>
+        </dgm:if>
+        <dgm:else name="Name9">
+          <dgm:alg type="lin">
+            <dgm:param type="linDir" val="fromR"/>
+          </dgm:alg>
+        </dgm:else>
+      </dgm:choose>
+      <dgm:shape xmlns:r="http://schemas.openxmlformats.org/officeDocument/2006/relationships" r:blip="">
+        <dgm:adjLst/>
+      </dgm:shape>
+      <dgm:presOf/>
+      <dgm:constrLst>
+        <dgm:constr type="w" for="ch" forName="compositeA" refType="w"/>
+        <dgm:constr type="h" for="ch" forName="compositeA" refType="h"/>
+        <dgm:constr type="w" for="ch" forName="compositeB" refType="w" refFor="ch" refForName="compositeA" op="equ"/>
+        <dgm:constr type="h" for="ch" forName="compositeB" refType="h" refFor="ch" refForName="compositeA" op="equ"/>
+        <dgm:constr type="primFontSz" for="des" ptType="node" op="equ" val="65"/>
+        <dgm:constr type="w" for="ch" forName="space" refType="w" refFor="ch" refForName="compositeA" op="equ" fact="0.05"/>
+      </dgm:constrLst>
+      <dgm:ruleLst/>
+      <dgm:forEach name="Name10" axis="ch" ptType="node">
+        <dgm:choose name="Name11">
+          <dgm:if name="Name12" axis="self" ptType="node" func="posOdd" op="equ" val="1">
+            <dgm:layoutNode name="compositeA">
+              <dgm:alg type="composite"/>
+              <dgm:shape xmlns:r="http://schemas.openxmlformats.org/officeDocument/2006/relationships" r:blip="">
+                <dgm:adjLst/>
+              </dgm:shape>
+              <dgm:presOf/>
+              <dgm:constrLst>
+                <dgm:constr type="w" for="ch" forName="textA" refType="w"/>
+                <dgm:constr type="h" for="ch" forName="textA" refType="h" fact="0.4"/>
+                <dgm:constr type="t" for="ch" forName="textA"/>
+                <dgm:constr type="l" for="ch" forName="textA"/>
+                <dgm:constr type="h" for="ch" forName="circleA" refType="h" fact="0.1"/>
+                <dgm:constr type="h" for="ch" forName="circleA" refType="w" op="lte"/>
+                <dgm:constr type="w" for="ch" forName="circleA" refType="h" refFor="ch" refForName="circleA" op="equ"/>
+                <dgm:constr type="ctrY" for="ch" forName="circleA" refType="h" fact="0.5"/>
+                <dgm:constr type="ctrX" for="ch" forName="circleA" refType="w" refFor="ch" refForName="textA" fact="0.5"/>
+                <dgm:constr type="w" for="ch" forName="spaceA" refType="w"/>
+                <dgm:constr type="h" for="ch" forName="spaceA" refType="h" fact="0.4"/>
+                <dgm:constr type="b" for="ch" forName="spaceA" refType="h"/>
+                <dgm:constr type="l" for="ch" forName="spaceA"/>
+              </dgm:constrLst>
+              <dgm:ruleLst/>
+              <dgm:layoutNode name="textA" styleLbl="revTx">
+                <dgm:varLst>
+                  <dgm:bulletEnabled val="1"/>
+                </dgm:varLst>
+                <dgm:alg type="tx">
+                  <dgm:param type="txAnchorVert" val="b"/>
+                  <dgm:param type="txAnchorVertCh" val="b"/>
+                  <dgm:param type="txAnchorHorzCh" val="ctr"/>
+                </dgm:alg>
+                <dgm:shape xmlns:r="http://schemas.openxmlformats.org/officeDocument/2006/relationships" type="rect" r:blip="">
+                  <dgm:adjLst/>
+                </dgm:shape>
+                <dgm:presOf axis="desOrSelf" ptType="node"/>
+                <dgm:constrLst/>
+                <dgm:ruleLst>
+                  <dgm:rule type="primFontSz" val="5" fact="NaN" max="NaN"/>
+                </dgm:ruleLst>
+              </dgm:layoutNode>
+              <dgm:layoutNode name="circleA">
+                <dgm:alg type="sp"/>
+                <dgm:shape xmlns:r="http://schemas.openxmlformats.org/officeDocument/2006/relationships" type="ellipse" r:blip="">
+                  <dgm:adjLst/>
+                </dgm:shape>
+                <dgm:presOf/>
+                <dgm:constrLst/>
+                <dgm:ruleLst/>
+              </dgm:layoutNode>
+              <dgm:layoutNode name="spaceA">
+                <dgm:alg type="sp"/>
+                <dgm:shape xmlns:r="http://schemas.openxmlformats.org/officeDocument/2006/relationships" r:blip="">
+                  <dgm:adjLst/>
+                </dgm:shape>
+                <dgm:presOf/>
+                <dgm:constrLst/>
+                <dgm:ruleLst/>
+              </dgm:layoutNode>
+            </dgm:layoutNode>
+          </dgm:if>
+          <dgm:else name="Name13">
+            <dgm:layoutNode name="compositeB">
+              <dgm:alg type="composite"/>
+              <dgm:shape xmlns:r="http://schemas.openxmlformats.org/officeDocument/2006/relationships" r:blip="">
+                <dgm:adjLst/>
+              </dgm:shape>
+              <dgm:presOf/>
+              <dgm:constrLst>
+                <dgm:constr type="w" for="ch" forName="textB" refType="w"/>
+                <dgm:constr type="h" for="ch" forName="textB" refType="h" fact="0.4"/>
+                <dgm:constr type="b" for="ch" forName="textB" refType="h"/>
+                <dgm:constr type="l" for="ch" forName="textB"/>
+                <dgm:constr type="h" for="ch" forName="circleB" refType="h" fact="0.1"/>
+                <dgm:constr type="w" for="ch" forName="circleB" refType="h" refFor="ch" refForName="circleB" op="equ"/>
+                <dgm:constr type="h" for="ch" forName="circleB" refType="w" op="lte"/>
+                <dgm:constr type="ctrY" for="ch" forName="circleB" refType="h" fact="0.5"/>
+                <dgm:constr type="ctrX" for="ch" forName="circleB" refType="w" refFor="ch" refForName="textB" fact="0.5"/>
+                <dgm:constr type="w" for="ch" forName="spaceB" refType="w"/>
+                <dgm:constr type="h" for="ch" forName="spaceB" refType="h" fact="0.4"/>
+                <dgm:constr type="t" for="ch" forName="spaceB"/>
+                <dgm:constr type="l" for="ch" forName="spaceB"/>
+              </dgm:constrLst>
+              <dgm:ruleLst/>
+              <dgm:layoutNode name="textB" styleLbl="revTx">
+                <dgm:varLst>
+                  <dgm:bulletEnabled val="1"/>
+                </dgm:varLst>
+                <dgm:alg type="tx">
+                  <dgm:param type="txAnchorVert" val="t"/>
+                  <dgm:param type="txAnchorVertCh" val="t"/>
+                  <dgm:param type="txAnchorHorzCh" val="ctr"/>
+                </dgm:alg>
+                <dgm:shape xmlns:r="http://schemas.openxmlformats.org/officeDocument/2006/relationships" type="rect" r:blip="">
+                  <dgm:adjLst/>
+                </dgm:shape>
+                <dgm:presOf axis="desOrSelf" ptType="node"/>
+                <dgm:constrLst/>
+                <dgm:ruleLst>
+                  <dgm:rule type="primFontSz" val="5" fact="NaN" max="NaN"/>
+                </dgm:ruleLst>
+              </dgm:layoutNode>
+              <dgm:layoutNode name="circleB">
+                <dgm:alg type="sp"/>
+                <dgm:shape xmlns:r="http://schemas.openxmlformats.org/officeDocument/2006/relationships" type="ellipse" r:blip="">
+                  <dgm:adjLst/>
+                </dgm:shape>
+                <dgm:presOf/>
+                <dgm:constrLst/>
+                <dgm:ruleLst/>
+              </dgm:layoutNode>
+              <dgm:layoutNode name="spaceB">
+                <dgm:alg type="sp"/>
+                <dgm:shape xmlns:r="http://schemas.openxmlformats.org/officeDocument/2006/relationships" r:blip="">
+                  <dgm:adjLst/>
+                </dgm:shape>
+                <dgm:presOf/>
+                <dgm:constrLst/>
+                <dgm:ruleLst/>
+              </dgm:layoutNode>
+            </dgm:layoutNode>
+          </dgm:else>
+        </dgm:choose>
+        <dgm:forEach name="Name14" axis="followSib" ptType="sibTrans" cnt="1">
+          <dgm:layoutNode name="space">
+            <dgm:alg type="sp"/>
+            <dgm:shape xmlns:r="http://schemas.openxmlformats.org/officeDocument/2006/relationships" r:blip="">
+              <dgm:adjLst/>
+            </dgm:shape>
+            <dgm:presOf/>
+            <dgm:constrLst/>
+            <dgm:ruleLst/>
+          </dgm:layoutNode>
+        </dgm:forEach>
+      </dgm:forEach>
+    </dgm:layoutNode>
+  </dgm:layoutNode>
+</dgm:layoutDef>
+</file>
+
 <file path=ppt/diagrams/quickStyle1.xml><?xml version="1.0" encoding="utf-8"?>
+<dgm:styleDef xmlns:dgm="http://schemas.openxmlformats.org/drawingml/2006/diagram" xmlns:a="http://schemas.openxmlformats.org/drawingml/2006/main" uniqueId="urn:microsoft.com/office/officeart/2005/8/quickstyle/simple1">
+  <dgm:title val=""/>
+  <dgm:desc val=""/>
+  <dgm:catLst>
+    <dgm:cat type="simple" pri="10100"/>
+  </dgm:catLst>
+  <dgm:scene3d>
+    <a:camera prst="orthographicFront"/>
+    <a:lightRig rig="threePt" dir="t"/>
+  </dgm:scene3d>
+  <dgm:styleLbl name="node0">
+    <dgm:scene3d>
+      <a:camera prst="orthographicFront"/>
+      <a:lightRig rig="threePt" dir="t"/>
+    </dgm:scene3d>
+    <dgm:sp3d/>
+    <dgm:txPr/>
+    <dgm:style>
+      <a:lnRef idx="2">
+        <a:scrgbClr r="0" g="0" b="0"/>
+      </a:lnRef>
+      <a:fillRef idx="1">
+        <a:scrgbClr r="0" g="0" b="0"/>
+      </a:fillRef>
+      <a:effectRef idx="0">
+        <a:scrgbClr r="0" g="0" b="0"/>
+      </a:effectRef>
+      <a:fontRef idx="minor">
+        <a:schemeClr val="lt1"/>
+      </a:fontRef>
+    </dgm:style>
+  </dgm:styleLbl>
+  <dgm:styleLbl name="lnNode1">
+    <dgm:scene3d>
+      <a:camera prst="orthographicFront"/>
+      <a:lightRig rig="threePt" dir="t"/>
+    </dgm:scene3d>
+    <dgm:sp3d/>
+    <dgm:txPr/>
+    <dgm:style>
+      <a:lnRef idx="2">
+        <a:scrgbClr r="0" g="0" b="0"/>
+      </a:lnRef>
+      <a:fillRef idx="1">
+        <a:scrgbClr r="0" g="0" b="0"/>
+      </a:fillRef>
+      <a:effectRef idx="0">
+        <a:scrgbClr r="0" g="0" b="0"/>
+      </a:effectRef>
+      <a:fontRef idx="minor">
+        <a:schemeClr val="lt1"/>
+      </a:fontRef>
+    </dgm:style>
+  </dgm:styleLbl>
+  <dgm:styleLbl name="vennNode1">
+    <dgm:scene3d>
+      <a:camera prst="orthographicFront"/>
+      <a:lightRig rig="threePt" dir="t"/>
+    </dgm:scene3d>
+    <dgm:sp3d/>
+    <dgm:txPr/>
+    <dgm:style>
+      <a:lnRef idx="2">
+        <a:scrgbClr r="0" g="0" b="0"/>
+      </a:lnRef>
+      <a:fillRef idx="1">
+        <a:scrgbClr r="0" g="0" b="0"/>
+      </a:fillRef>
+      <a:effectRef idx="0">
+        <a:scrgbClr r="0" g="0" b="0"/>
+      </a:effectRef>
+      <a:fontRef idx="minor">
+        <a:schemeClr val="tx1"/>
+      </a:fontRef>
+    </dgm:style>
+  </dgm:styleLbl>
+  <dgm:styleLbl name="alignNode1">
+    <dgm:scene3d>
+      <a:camera prst="orthographicFront"/>
+      <a:lightRig rig="threePt" dir="t"/>
+    </dgm:scene3d>
+    <dgm:sp3d/>
+    <dgm:txPr/>
+    <dgm:style>
+      <a:lnRef idx="2">
+        <a:scrgbClr r="0" g="0" b="0"/>
+      </a:lnRef>
+      <a:fillRef idx="1">
+        <a:scrgbClr r="0" g="0" b="0"/>
+      </a:fillRef>
+      <a:effectRef idx="0">
+        <a:scrgbClr r="0" g="0" b="0"/>
+      </a:effectRef>
+      <a:fontRef idx="minor">
+        <a:schemeClr val="lt1"/>
+      </a:fontRef>
+    </dgm:style>
+  </dgm:styleLbl>
+  <dgm:styleLbl name="node1">
+    <dgm:scene3d>
+      <a:camera prst="orthographicFront"/>
+      <a:lightRig rig="threePt" dir="t"/>
+    </dgm:scene3d>
+    <dgm:sp3d/>
+    <dgm:txPr/>
+    <dgm:style>
+      <a:lnRef idx="2">
+        <a:scrgbClr r="0" g="0" b="0"/>
+      </a:lnRef>
+      <a:fillRef idx="1">
+        <a:scrgbClr r="0" g="0" b="0"/>
+      </a:fillRef>
+      <a:effectRef idx="0">
+        <a:scrgbClr r="0" g="0" b="0"/>
+      </a:effectRef>
+      <a:fontRef idx="minor">
+        <a:schemeClr val="lt1"/>
+      </a:fontRef>
+    </dgm:style>
+  </dgm:styleLbl>
+  <dgm:styleLbl name="node2">
+    <dgm:scene3d>
+      <a:camera prst="orthographicFront"/>
+      <a:lightRig rig="threePt" dir="t"/>
+    </dgm:scene3d>
+    <dgm:sp3d/>
+    <dgm:txPr/>
+    <dgm:style>
+      <a:lnRef idx="2">
+        <a:scrgbClr r="0" g="0" b="0"/>
+      </a:lnRef>
+      <a:fillRef idx="1">
+        <a:scrgbClr r="0" g="0" b="0"/>
+      </a:fillRef>
+      <a:effectRef idx="0">
+        <a:scrgbClr r="0" g="0" b="0"/>
+      </a:effectRef>
+      <a:fontRef idx="minor">
+        <a:schemeClr val="lt1"/>
+      </a:fontRef>
+    </dgm:style>
+  </dgm:styleLbl>
+  <dgm:styleLbl name="node3">
+    <dgm:scene3d>
+      <a:camera prst="orthographicFront"/>
+      <a:lightRig rig="threePt" dir="t"/>
+    </dgm:scene3d>
+    <dgm:sp3d/>
+    <dgm:txPr/>
+    <dgm:style>
+      <a:lnRef idx="2">
+        <a:scrgbClr r="0" g="0" b="0"/>
+      </a:lnRef>
+      <a:fillRef idx="1">
+        <a:scrgbClr r="0" g="0" b="0"/>
+      </a:fillRef>
+      <a:effectRef idx="0">
+        <a:scrgbClr r="0" g="0" b="0"/>
+      </a:effectRef>
+      <a:fontRef idx="minor">
+        <a:schemeClr val="lt1"/>
+      </a:fontRef>
+    </dgm:style>
+  </dgm:styleLbl>
+  <dgm:styleLbl name="node4">
+    <dgm:scene3d>
+      <a:camera prst="orthographicFront"/>
+      <a:lightRig rig="threePt" dir="t"/>
+    </dgm:scene3d>
+    <dgm:sp3d/>
+    <dgm:txPr/>
+    <dgm:style>
+      <a:lnRef idx="2">
+        <a:scrgbClr r="0" g="0" b="0"/>
+      </a:lnRef>
+      <a:fillRef idx="1">
+        <a:scrgbClr r="0" g="0" b="0"/>
+      </a:fillRef>
+      <a:effectRef idx="0">
+        <a:scrgbClr r="0" g="0" b="0"/>
+      </a:effectRef>
+      <a:fontRef idx="minor">
+        <a:schemeClr val="lt1"/>
+      </a:fontRef>
+    </dgm:style>
+  </dgm:styleLbl>
+  <dgm:styleLbl name="fgImgPlace1">
+    <dgm:scene3d>
+      <a:camera prst="orthographicFront"/>
+      <a:lightRig rig="threePt" dir="t"/>
+    </dgm:scene3d>
+    <dgm:sp3d/>
+    <dgm:txPr/>
+    <dgm:style>
+      <a:lnRef idx="2">
+        <a:scrgbClr r="0" g="0" b="0"/>
+      </a:lnRef>
+      <a:fillRef idx="1">
+        <a:scrgbClr r="0" g="0" b="0"/>
+      </a:fillRef>
+      <a:effectRef idx="0">
+        <a:scrgbClr r="0" g="0" b="0"/>
+      </a:effectRef>
+      <a:fontRef idx="minor"/>
+    </dgm:style>
+  </dgm:styleLbl>
+  <dgm:styleLbl name="alignImgPlace1">
+    <dgm:scene3d>
+      <a:camera prst="orthographicFront"/>
+      <a:lightRig rig="threePt" dir="t"/>
+    </dgm:scene3d>
+    <dgm:sp3d/>
+    <dgm:txPr/>
+    <dgm:style>
+      <a:lnRef idx="2">
+        <a:scrgbClr r="0" g="0" b="0"/>
+      </a:lnRef>
+      <a:fillRef idx="1">
+        <a:scrgbClr r="0" g="0" b="0"/>
+      </a:fillRef>
+      <a:effectRef idx="0">
+        <a:scrgbClr r="0" g="0" b="0"/>
+      </a:effectRef>
+      <a:fontRef idx="minor"/>
+    </dgm:style>
+  </dgm:styleLbl>
+  <dgm:styleLbl name="bgImgPlace1">
+    <dgm:scene3d>
+      <a:camera prst="orthographicFront"/>
+      <a:lightRig rig="threePt" dir="t"/>
+    </dgm:scene3d>
+    <dgm:sp3d/>
+    <dgm:txPr/>
+    <dgm:style>
+      <a:lnRef idx="2">
+        <a:scrgbClr r="0" g="0" b="0"/>
+      </a:lnRef>
+      <a:fillRef idx="1">
+        <a:scrgbClr r="0" g="0" b="0"/>
+      </a:fillRef>
+      <a:effectRef idx="0">
+        <a:scrgbClr r="0" g="0" b="0"/>
+      </a:effectRef>
+      <a:fontRef idx="minor"/>
+    </dgm:style>
+  </dgm:styleLbl>
+  <dgm:styleLbl name="sibTrans2D1">
+    <dgm:scene3d>
+      <a:camera prst="orthographicFront"/>
+      <a:lightRig rig="threePt" dir="t"/>
+    </dgm:scene3d>
+    <dgm:sp3d/>
+    <dgm:txPr/>
+    <dgm:style>
+      <a:lnRef idx="0">
+        <a:scrgbClr r="0" g="0" b="0"/>
+      </a:lnRef>
+      <a:fillRef idx="1">
+        <a:scrgbClr r="0" g="0" b="0"/>
+      </a:fillRef>
+      <a:effectRef idx="0">
+        <a:scrgbClr r="0" g="0" b="0"/>
+      </a:effectRef>
+      <a:fontRef idx="minor">
+        <a:schemeClr val="lt1"/>
+      </a:fontRef>
+    </dgm:style>
+  </dgm:styleLbl>
+  <dgm:styleLbl name="fgSibTrans2D1">
+    <dgm:scene3d>
+      <a:camera prst="orthographicFront"/>
+      <a:lightRig rig="threePt" dir="t"/>
+    </dgm:scene3d>
+    <dgm:sp3d/>
+    <dgm:txPr/>
+    <dgm:style>
+      <a:lnRef idx="0">
+        <a:scrgbClr r="0" g="0" b="0"/>
+      </a:lnRef>
+      <a:fillRef idx="1">
+        <a:scrgbClr r="0" g="0" b="0"/>
+      </a:fillRef>
+      <a:effectRef idx="0">
+        <a:scrgbClr r="0" g="0" b="0"/>
+      </a:effectRef>
+      <a:fontRef idx="minor">
+        <a:schemeClr val="lt1"/>
+      </a:fontRef>
+    </dgm:style>
+  </dgm:styleLbl>
+  <dgm:styleLbl name="bgSibTrans2D1">
+    <dgm:scene3d>
+      <a:camera prst="orthographicFront"/>
+      <a:lightRig rig="threePt" dir="t"/>
+    </dgm:scene3d>
+    <dgm:sp3d/>
+    <dgm:txPr/>
+    <dgm:style>
+      <a:lnRef idx="0">
+        <a:scrgbClr r="0" g="0" b="0"/>
+      </a:lnRef>
+      <a:fillRef idx="1">
+        <a:scrgbClr r="0" g="0" b="0"/>
+      </a:fillRef>
+      <a:effectRef idx="0">
+        <a:scrgbClr r="0" g="0" b="0"/>
+      </a:effectRef>
+      <a:fontRef idx="minor">
+        <a:schemeClr val="lt1"/>
+      </a:fontRef>
+    </dgm:style>
+  </dgm:styleLbl>
+  <dgm:styleLbl name="sibTrans1D1">
+    <dgm:scene3d>
+      <a:camera prst="orthographicFront"/>
+      <a:lightRig rig="threePt" dir="t"/>
+    </dgm:scene3d>
+    <dgm:sp3d/>
+    <dgm:txPr/>
+    <dgm:style>
+      <a:lnRef idx="1">
+        <a:scrgbClr r="0" g="0" b="0"/>
+      </a:lnRef>
+      <a:fillRef idx="0">
+        <a:scrgbClr r="0" g="0" b="0"/>
+      </a:fillRef>
+      <a:effectRef idx="0">
+        <a:scrgbClr r="0" g="0" b="0"/>
+      </a:effectRef>
+      <a:fontRef idx="minor"/>
+    </dgm:style>
+  </dgm:styleLbl>
+  <dgm:styleLbl name="callout">
+    <dgm:scene3d>
+      <a:camera prst="orthographicFront"/>
+      <a:lightRig rig="threePt" dir="t"/>
+    </dgm:scene3d>
+    <dgm:sp3d/>
+    <dgm:txPr/>
+    <dgm:style>
+      <a:lnRef idx="2">
+        <a:scrgbClr r="0" g="0" b="0"/>
+      </a:lnRef>
+      <a:fillRef idx="1">
+        <a:scrgbClr r="0" g="0" b="0"/>
+      </a:fillRef>
+      <a:effectRef idx="0">
+        <a:scrgbClr r="0" g="0" b="0"/>
+      </a:effectRef>
+      <a:fontRef idx="minor"/>
+    </dgm:style>
+  </dgm:styleLbl>
+  <dgm:styleLbl name="asst0">
+    <dgm:scene3d>
+      <a:camera prst="orthographicFront"/>
+      <a:lightRig rig="threePt" dir="t"/>
+    </dgm:scene3d>
+    <dgm:sp3d/>
+    <dgm:txPr/>
+    <dgm:style>
+      <a:lnRef idx="2">
+        <a:scrgbClr r="0" g="0" b="0"/>
+      </a:lnRef>
+      <a:fillRef idx="1">
+        <a:scrgbClr r="0" g="0" b="0"/>
+      </a:fillRef>
+      <a:effectRef idx="0">
+        <a:scrgbClr r="0" g="0" b="0"/>
+      </a:effectRef>
+      <a:fontRef idx="minor">
+        <a:schemeClr val="lt1"/>
+      </a:fontRef>
+    </dgm:style>
+  </dgm:styleLbl>
+  <dgm:styleLbl name="asst1">
+    <dgm:scene3d>
+      <a:camera prst="orthographicFront"/>
+      <a:lightRig rig="threePt" dir="t"/>
+    </dgm:scene3d>
+    <dgm:sp3d/>
+    <dgm:txPr/>
+    <dgm:style>
+      <a:lnRef idx="2">
+        <a:scrgbClr r="0" g="0" b="0"/>
+      </a:lnRef>
+      <a:fillRef idx="1">
+        <a:scrgbClr r="0" g="0" b="0"/>
+      </a:fillRef>
+      <a:effectRef idx="0">
+        <a:scrgbClr r="0" g="0" b="0"/>
+      </a:effectRef>
+      <a:fontRef idx="minor">
+        <a:schemeClr val="lt1"/>
+      </a:fontRef>
+    </dgm:style>
+  </dgm:styleLbl>
+  <dgm:styleLbl name="asst2">
+    <dgm:scene3d>
+      <a:camera prst="orthographicFront"/>
+      <a:lightRig rig="threePt" dir="t"/>
+    </dgm:scene3d>
+    <dgm:sp3d/>
+    <dgm:txPr/>
+    <dgm:style>
+      <a:lnRef idx="2">
+        <a:scrgbClr r="0" g="0" b="0"/>
+      </a:lnRef>
+      <a:fillRef idx="1">
+        <a:scrgbClr r="0" g="0" b="0"/>
+      </a:fillRef>
+      <a:effectRef idx="0">
+        <a:scrgbClr r="0" g="0" b="0"/>
+      </a:effectRef>
+      <a:fontRef idx="minor">
+        <a:schemeClr val="lt1"/>
+      </a:fontRef>
+    </dgm:style>
+  </dgm:styleLbl>
+  <dgm:styleLbl name="asst3">
+    <dgm:scene3d>
+      <a:camera prst="orthographicFront"/>
+      <a:lightRig rig="threePt" dir="t"/>
+    </dgm:scene3d>
+    <dgm:sp3d/>
+    <dgm:txPr/>
+    <dgm:style>
+      <a:lnRef idx="2">
+        <a:scrgbClr r="0" g="0" b="0"/>
+      </a:lnRef>
+      <a:fillRef idx="1">
+        <a:scrgbClr r="0" g="0" b="0"/>
+      </a:fillRef>
+      <a:effectRef idx="0">
+        <a:scrgbClr r="0" g="0" b="0"/>
+      </a:effectRef>
+      <a:fontRef idx="minor">
+        <a:schemeClr val="lt1"/>
+      </a:fontRef>
+    </dgm:style>
+  </dgm:styleLbl>
+  <dgm:styleLbl name="asst4">
+    <dgm:scene3d>
+      <a:camera prst="orthographicFront"/>
+      <a:lightRig rig="threePt" dir="t"/>
+    </dgm:scene3d>
+    <dgm:sp3d/>
+    <dgm:txPr/>
+    <dgm:style>
+      <a:lnRef idx="2">
+        <a:scrgbClr r="0" g="0" b="0"/>
+      </a:lnRef>
+      <a:fillRef idx="1">
+        <a:scrgbClr r="0" g="0" b="0"/>
+      </a:fillRef>
+      <a:effectRef idx="0">
+        <a:scrgbClr r="0" g="0" b="0"/>
+      </a:effectRef>
+      <a:fontRef idx="minor">
+        <a:schemeClr val="lt1"/>
+      </a:fontRef>
+    </dgm:style>
+  </dgm:styleLbl>
+  <dgm:styleLbl name="parChTrans2D1">
+    <dgm:scene3d>
+      <a:camera prst="orthographicFront"/>
+      <a:lightRig rig="threePt" dir="t"/>
+    </dgm:scene3d>
+    <dgm:sp3d/>
+    <dgm:txPr/>
+    <dgm:style>
+      <a:lnRef idx="2">
+        <a:scrgbClr r="0" g="0" b="0"/>
+      </a:lnRef>
+      <a:fillRef idx="1">
+        <a:scrgbClr r="0" g="0" b="0"/>
+      </a:fillRef>
+      <a:effectRef idx="0">
+        <a:scrgbClr r="0" g="0" b="0"/>
+      </a:effectRef>
+      <a:fontRef idx="minor">
+        <a:schemeClr val="lt1"/>
+      </a:fontRef>
+    </dgm:style>
+  </dgm:styleLbl>
+  <dgm:styleLbl name="parChTrans2D2">
+    <dgm:scene3d>
+      <a:camera prst="orthographicFront"/>
+      <a:lightRig rig="threePt" dir="t"/>
+    </dgm:scene3d>
+    <dgm:sp3d/>
+    <dgm:txPr/>
+    <dgm:style>
+      <a:lnRef idx="2">
+        <a:scrgbClr r="0" g="0" b="0"/>
+      </a:lnRef>
+      <a:fillRef idx="1">
+        <a:scrgbClr r="0" g="0" b="0"/>
+      </a:fillRef>
+      <a:effectRef idx="0">
+        <a:scrgbClr r="0" g="0" b="0"/>
+      </a:effectRef>
+      <a:fontRef idx="minor">
+        <a:schemeClr val="lt1"/>
+      </a:fontRef>
+    </dgm:style>
+  </dgm:styleLbl>
+  <dgm:styleLbl name="parChTrans2D3">
+    <dgm:scene3d>
+      <a:camera prst="orthographicFront"/>
+      <a:lightRig rig="threePt" dir="t"/>
+    </dgm:scene3d>
+    <dgm:sp3d/>
+    <dgm:txPr/>
+    <dgm:style>
+      <a:lnRef idx="2">
+        <a:scrgbClr r="0" g="0" b="0"/>
+      </a:lnRef>
+      <a:fillRef idx="1">
+        <a:scrgbClr r="0" g="0" b="0"/>
+      </a:fillRef>
+      <a:effectRef idx="0">
+        <a:scrgbClr r="0" g="0" b="0"/>
+      </a:effectRef>
+      <a:fontRef idx="minor">
+        <a:schemeClr val="lt1"/>
+      </a:fontRef>
+    </dgm:style>
+  </dgm:styleLbl>
+  <dgm:styleLbl name="parChTrans2D4">
+    <dgm:scene3d>
+      <a:camera prst="orthographicFront"/>
+      <a:lightRig rig="threePt" dir="t"/>
+    </dgm:scene3d>
+    <dgm:sp3d/>
+    <dgm:txPr/>
+    <dgm:style>
+      <a:lnRef idx="2">
+        <a:scrgbClr r="0" g="0" b="0"/>
+      </a:lnRef>
+      <a:fillRef idx="1">
+        <a:scrgbClr r="0" g="0" b="0"/>
+      </a:fillRef>
+      <a:effectRef idx="0">
+        <a:scrgbClr r="0" g="0" b="0"/>
+      </a:effectRef>
+      <a:fontRef idx="minor">
+        <a:schemeClr val="lt1"/>
+      </a:fontRef>
+    </dgm:style>
+  </dgm:styleLbl>
+  <dgm:styleLbl name="parChTrans1D1">
+    <dgm:scene3d>
+      <a:camera prst="orthographicFront"/>
+      <a:lightRig rig="threePt" dir="t"/>
+    </dgm:scene3d>
+    <dgm:sp3d/>
+    <dgm:txPr/>
+    <dgm:style>
+      <a:lnRef idx="2">
+        <a:scrgbClr r="0" g="0" b="0"/>
+      </a:lnRef>
+      <a:fillRef idx="0">
+        <a:scrgbClr r="0" g="0" b="0"/>
+      </a:fillRef>
+      <a:effectRef idx="0">
+        <a:scrgbClr r="0" g="0" b="0"/>
+      </a:effectRef>
+      <a:fontRef idx="minor"/>
+    </dgm:style>
+  </dgm:styleLbl>
+  <dgm:styleLbl name="parChTrans1D2">
+    <dgm:scene3d>
+      <a:camera prst="orthographicFront"/>
+      <a:lightRig rig="threePt" dir="t"/>
+    </dgm:scene3d>
+    <dgm:sp3d/>
+    <dgm:txPr/>
+    <dgm:style>
+      <a:lnRef idx="2">
+        <a:scrgbClr r="0" g="0" b="0"/>
+      </a:lnRef>
+      <a:fillRef idx="0">
+        <a:scrgbClr r="0" g="0" b="0"/>
+      </a:fillRef>
+      <a:effectRef idx="0">
+        <a:scrgbClr r="0" g="0" b="0"/>
+      </a:effectRef>
+      <a:fontRef idx="minor"/>
+    </dgm:style>
+  </dgm:styleLbl>
+  <dgm:styleLbl name="parChTrans1D3">
+    <dgm:scene3d>
+      <a:camera prst="orthographicFront"/>
+      <a:lightRig rig="threePt" dir="t"/>
+    </dgm:scene3d>
+    <dgm:sp3d/>
+    <dgm:txPr/>
+    <dgm:style>
+      <a:lnRef idx="2">
+        <a:scrgbClr r="0" g="0" b="0"/>
+      </a:lnRef>
+      <a:fillRef idx="0">
+        <a:scrgbClr r="0" g="0" b="0"/>
+      </a:fillRef>
+      <a:effectRef idx="0">
+        <a:scrgbClr r="0" g="0" b="0"/>
+      </a:effectRef>
+      <a:fontRef idx="minor"/>
+    </dgm:style>
+  </dgm:styleLbl>
+  <dgm:styleLbl name="parChTrans1D4">
+    <dgm:scene3d>
+      <a:camera prst="orthographicFront"/>
+      <a:lightRig rig="threePt" dir="t"/>
+    </dgm:scene3d>
+    <dgm:sp3d/>
+    <dgm:txPr/>
+    <dgm:style>
+      <a:lnRef idx="2">
+        <a:scrgbClr r="0" g="0" b="0"/>
+      </a:lnRef>
+      <a:fillRef idx="0">
+        <a:scrgbClr r="0" g="0" b="0"/>
+      </a:fillRef>
+      <a:effectRef idx="0">
+        <a:scrgbClr r="0" g="0" b="0"/>
+      </a:effectRef>
+      <a:fontRef idx="minor"/>
+    </dgm:style>
+  </dgm:styleLbl>
+  <dgm:styleLbl name="fgAcc1">
+    <dgm:scene3d>
+      <a:camera prst="orthographicFront"/>
+      <a:lightRig rig="threePt" dir="t"/>
+    </dgm:scene3d>
+    <dgm:sp3d/>
+    <dgm:txPr/>
+    <dgm:style>
+      <a:lnRef idx="2">
+        <a:scrgbClr r="0" g="0" b="0"/>
+      </a:lnRef>
+      <a:fillRef idx="1">
+        <a:scrgbClr r="0" g="0" b="0"/>
+      </a:fillRef>
+      <a:effectRef idx="0">
+        <a:scrgbClr r="0" g="0" b="0"/>
+      </a:effectRef>
+      <a:fontRef idx="minor"/>
+    </dgm:style>
+  </dgm:styleLbl>
+  <dgm:styleLbl name="conFgAcc1">
+    <dgm:scene3d>
+      <a:camera prst="orthographicFront"/>
+      <a:lightRig rig="threePt" dir="t"/>
+    </dgm:scene3d>
+    <dgm:sp3d/>
+    <dgm:txPr/>
+    <dgm:style>
+      <a:lnRef idx="2">
+        <a:scrgbClr r="0" g="0" b="0"/>
+      </a:lnRef>
+      <a:fillRef idx="1">
+        <a:scrgbClr r="0" g="0" b="0"/>
+      </a:fillRef>
+      <a:effectRef idx="0">
+        <a:scrgbClr r="0" g="0" b="0"/>
+      </a:effectRef>
+      <a:fontRef idx="minor"/>
+    </dgm:style>
+  </dgm:styleLbl>
+  <dgm:styleLbl name="alignAcc1">
+    <dgm:scene3d>
+      <a:camera prst="orthographicFront"/>
+      <a:lightRig rig="threePt" dir="t"/>
+    </dgm:scene3d>
+    <dgm:sp3d/>
+    <dgm:txPr/>
+    <dgm:style>
+      <a:lnRef idx="2">
+        <a:scrgbClr r="0" g="0" b="0"/>
+      </a:lnRef>
+      <a:fillRef idx="1">
+        <a:scrgbClr r="0" g="0" b="0"/>
+      </a:fillRef>
+      <a:effectRef idx="0">
+        <a:scrgbClr r="0" g="0" b="0"/>
+      </a:effectRef>
+      <a:fontRef idx="minor"/>
+    </dgm:style>
+  </dgm:styleLbl>
+  <dgm:styleLbl name="trAlignAcc1">
+    <dgm:scene3d>
+      <a:camera prst="orthographicFront"/>
+      <a:lightRig rig="threePt" dir="t"/>
+    </dgm:scene3d>
+    <dgm:sp3d/>
+    <dgm:txPr/>
+    <dgm:style>
+      <a:lnRef idx="1">
+        <a:scrgbClr r="0" g="0" b="0"/>
+      </a:lnRef>
+      <a:fillRef idx="1">
+        <a:scrgbClr r="0" g="0" b="0"/>
+      </a:fillRef>
+      <a:effectRef idx="0">
+        <a:scrgbClr r="0" g="0" b="0"/>
+      </a:effectRef>
+      <a:fontRef idx="minor"/>
+    </dgm:style>
+  </dgm:styleLbl>
+  <dgm:styleLbl name="bgAcc1">
+    <dgm:scene3d>
+      <a:camera prst="orthographicFront"/>
+      <a:lightRig rig="threePt" dir="t"/>
+    </dgm:scene3d>
+    <dgm:sp3d/>
+    <dgm:txPr/>
+    <dgm:style>
+      <a:lnRef idx="2">
+        <a:scrgbClr r="0" g="0" b="0"/>
+      </a:lnRef>
+      <a:fillRef idx="1">
+        <a:scrgbClr r="0" g="0" b="0"/>
+      </a:fillRef>
+      <a:effectRef idx="0">
+        <a:scrgbClr r="0" g="0" b="0"/>
+      </a:effectRef>
+      <a:fontRef idx="minor"/>
+    </dgm:style>
+  </dgm:styleLbl>
+  <dgm:styleLbl name="solidFgAcc1">
+    <dgm:scene3d>
+      <a:camera prst="orthographicFront"/>
+      <a:lightRig rig="threePt" dir="t"/>
+    </dgm:scene3d>
+    <dgm:sp3d/>
+    <dgm:txPr/>
+    <dgm:style>
+      <a:lnRef idx="2">
+        <a:scrgbClr r="0" g="0" b="0"/>
+      </a:lnRef>
+      <a:fillRef idx="1">
+        <a:scrgbClr r="0" g="0" b="0"/>
+      </a:fillRef>
+      <a:effectRef idx="0">
+        <a:scrgbClr r="0" g="0" b="0"/>
+      </a:effectRef>
+      <a:fontRef idx="minor"/>
+    </dgm:style>
+  </dgm:styleLbl>
+  <dgm:styleLbl name="solidAlignAcc1">
+    <dgm:scene3d>
+      <a:camera prst="orthographicFront"/>
+      <a:lightRig rig="threePt" dir="t"/>
+    </dgm:scene3d>
+    <dgm:sp3d/>
+    <dgm:txPr/>
+    <dgm:style>
+      <a:lnRef idx="2">
+        <a:scrgbClr r="0" g="0" b="0"/>
+      </a:lnRef>
+      <a:fillRef idx="1">
+        <a:scrgbClr r="0" g="0" b="0"/>
+      </a:fillRef>
+      <a:effectRef idx="0">
+        <a:scrgbClr r="0" g="0" b="0"/>
+      </a:effectRef>
+      <a:fontRef idx="minor"/>
+    </dgm:style>
+  </dgm:styleLbl>
+  <dgm:styleLbl name="solidBgAcc1">
+    <dgm:scene3d>
+      <a:camera prst="orthographicFront"/>
+      <a:lightRig rig="threePt" dir="t"/>
+    </dgm:scene3d>
+    <dgm:sp3d/>
+    <dgm:txPr/>
+    <dgm:style>
+      <a:lnRef idx="2">
+        <a:scrgbClr r="0" g="0" b="0"/>
+      </a:lnRef>
+      <a:fillRef idx="1">
+        <a:scrgbClr r="0" g="0" b="0"/>
+      </a:fillRef>
+      <a:effectRef idx="0">
+        <a:scrgbClr r="0" g="0" b="0"/>
+      </a:effectRef>
+      <a:fontRef idx="minor"/>
+    </dgm:style>
+  </dgm:styleLbl>
+  <dgm:styleLbl name="fgAccFollowNode1">
+    <dgm:scene3d>
+      <a:camera prst="orthographicFront"/>
+      <a:lightRig rig="threePt" dir="t"/>
+    </dgm:scene3d>
+    <dgm:sp3d/>
+    <dgm:txPr/>
+    <dgm:style>
+      <a:lnRef idx="2">
+        <a:scrgbClr r="0" g="0" b="0"/>
+      </a:lnRef>
+      <a:fillRef idx="1">
+        <a:scrgbClr r="0" g="0" b="0"/>
+      </a:fillRef>
+      <a:effectRef idx="0">
+        <a:scrgbClr r="0" g="0" b="0"/>
+      </a:effectRef>
+      <a:fontRef idx="minor"/>
+    </dgm:style>
+  </dgm:styleLbl>
+  <dgm:styleLbl name="alignAccFollowNode1">
+    <dgm:scene3d>
+      <a:camera prst="orthographicFront"/>
+      <a:lightRig rig="threePt" dir="t"/>
+    </dgm:scene3d>
+    <dgm:sp3d/>
+    <dgm:txPr/>
+    <dgm:style>
+      <a:lnRef idx="2">
+        <a:scrgbClr r="0" g="0" b="0"/>
+      </a:lnRef>
+      <a:fillRef idx="1">
+        <a:scrgbClr r="0" g="0" b="0"/>
+      </a:fillRef>
+      <a:effectRef idx="0">
+        <a:scrgbClr r="0" g="0" b="0"/>
+      </a:effectRef>
+      <a:fontRef idx="minor"/>
+    </dgm:style>
+  </dgm:styleLbl>
+  <dgm:styleLbl name="bgAccFollowNode1">
+    <dgm:scene3d>
+      <a:camera prst="orthographicFront"/>
+      <a:lightRig rig="threePt" dir="t"/>
+    </dgm:scene3d>
+    <dgm:sp3d/>
+    <dgm:txPr/>
+    <dgm:style>
+      <a:lnRef idx="2">
+        <a:scrgbClr r="0" g="0" b="0"/>
+      </a:lnRef>
+      <a:fillRef idx="1">
+        <a:scrgbClr r="0" g="0" b="0"/>
+      </a:fillRef>
+      <a:effectRef idx="0">
+        <a:scrgbClr r="0" g="0" b="0"/>
+      </a:effectRef>
+      <a:fontRef idx="minor"/>
+    </dgm:style>
+  </dgm:styleLbl>
+  <dgm:styleLbl name="fgAcc0">
+    <dgm:scene3d>
+      <a:camera prst="orthographicFront"/>
+      <a:lightRig rig="threePt" dir="t"/>
+    </dgm:scene3d>
+    <dgm:sp3d/>
+    <dgm:txPr/>
+    <dgm:style>
+      <a:lnRef idx="2">
+        <a:scrgbClr r="0" g="0" b="0"/>
+      </a:lnRef>
+      <a:fillRef idx="1">
+        <a:scrgbClr r="0" g="0" b="0"/>
+      </a:fillRef>
+      <a:effectRef idx="0">
+        <a:scrgbClr r="0" g="0" b="0"/>
+      </a:effectRef>
+      <a:fontRef idx="minor"/>
+    </dgm:style>
+  </dgm:styleLbl>
+  <dgm:styleLbl name="fgAcc2">
+    <dgm:scene3d>
+      <a:camera prst="orthographicFront"/>
+      <a:lightRig rig="threePt" dir="t"/>
+    </dgm:scene3d>
+    <dgm:sp3d/>
+    <dgm:txPr/>
+    <dgm:style>
+      <a:lnRef idx="2">
+        <a:scrgbClr r="0" g="0" b="0"/>
+      </a:lnRef>
+      <a:fillRef idx="1">
+        <a:scrgbClr r="0" g="0" b="0"/>
+      </a:fillRef>
+      <a:effectRef idx="0">
+        <a:scrgbClr r="0" g="0" b="0"/>
+      </a:effectRef>
+      <a:fontRef idx="minor"/>
+    </dgm:style>
+  </dgm:styleLbl>
+  <dgm:styleLbl name="fgAcc3">
+    <dgm:scene3d>
+      <a:camera prst="orthographicFront"/>
+      <a:lightRig rig="threePt" dir="t"/>
+    </dgm:scene3d>
+    <dgm:sp3d/>
+    <dgm:txPr/>
+    <dgm:style>
+      <a:lnRef idx="2">
+        <a:scrgbClr r="0" g="0" b="0"/>
+      </a:lnRef>
+      <a:fillRef idx="1">
+        <a:scrgbClr r="0" g="0" b="0"/>
+      </a:fillRef>
+      <a:effectRef idx="0">
+        <a:scrgbClr r="0" g="0" b="0"/>
+      </a:effectRef>
+      <a:fontRef idx="minor"/>
+    </dgm:style>
+  </dgm:styleLbl>
+  <dgm:styleLbl name="fgAcc4">
+    <dgm:scene3d>
+      <a:camera prst="orthographicFront"/>
+      <a:lightRig rig="threePt" dir="t"/>
+    </dgm:scene3d>
+    <dgm:sp3d/>
+    <dgm:txPr/>
+    <dgm:style>
+      <a:lnRef idx="2">
+        <a:scrgbClr r="0" g="0" b="0"/>
+      </a:lnRef>
+      <a:fillRef idx="1">
+        <a:scrgbClr r="0" g="0" b="0"/>
+      </a:fillRef>
+      <a:effectRef idx="0">
+        <a:scrgbClr r="0" g="0" b="0"/>
+      </a:effectRef>
+      <a:fontRef idx="minor"/>
+    </dgm:style>
+  </dgm:styleLbl>
+  <dgm:styleLbl name="bgShp">
+    <dgm:scene3d>
+      <a:camera prst="orthographicFront"/>
+      <a:lightRig rig="threePt" dir="t"/>
+    </dgm:scene3d>
+    <dgm:sp3d/>
+    <dgm:txPr/>
+    <dgm:style>
+      <a:lnRef idx="0">
+        <a:scrgbClr r="0" g="0" b="0"/>
+      </a:lnRef>
+      <a:fillRef idx="1">
+        <a:scrgbClr r="0" g="0" b="0"/>
+      </a:fillRef>
+      <a:effectRef idx="0">
+        <a:scrgbClr r="0" g="0" b="0"/>
+      </a:effectRef>
+      <a:fontRef idx="minor"/>
+    </dgm:style>
+  </dgm:styleLbl>
+  <dgm:styleLbl name="dkBgShp">
+    <dgm:scene3d>
+      <a:camera prst="orthographicFront"/>
+      <a:lightRig rig="threePt" dir="t"/>
+    </dgm:scene3d>
+    <dgm:sp3d/>
+    <dgm:txPr/>
+    <dgm:style>
+      <a:lnRef idx="0">
+        <a:scrgbClr r="0" g="0" b="0"/>
+      </a:lnRef>
+      <a:fillRef idx="1">
+        <a:scrgbClr r="0" g="0" b="0"/>
+      </a:fillRef>
+      <a:effectRef idx="0">
+        <a:scrgbClr r="0" g="0" b="0"/>
+      </a:effectRef>
+      <a:fontRef idx="minor"/>
+    </dgm:style>
+  </dgm:styleLbl>
+  <dgm:styleLbl name="trBgShp">
+    <dgm:scene3d>
+      <a:camera prst="orthographicFront"/>
+      <a:lightRig rig="threePt" dir="t"/>
+    </dgm:scene3d>
+    <dgm:sp3d/>
+    <dgm:txPr/>
+    <dgm:style>
+      <a:lnRef idx="0">
+        <a:scrgbClr r="0" g="0" b="0"/>
+      </a:lnRef>
+      <a:fillRef idx="1">
+        <a:scrgbClr r="0" g="0" b="0"/>
+      </a:fillRef>
+      <a:effectRef idx="0">
+        <a:scrgbClr r="0" g="0" b="0"/>
+      </a:effectRef>
+      <a:fontRef idx="minor"/>
+    </dgm:style>
+  </dgm:styleLbl>
+  <dgm:styleLbl name="fgShp">
+    <dgm:scene3d>
+      <a:camera prst="orthographicFront"/>
+      <a:lightRig rig="threePt" dir="t"/>
+    </dgm:scene3d>
+    <dgm:sp3d/>
+    <dgm:txPr/>
+    <dgm:style>
+      <a:lnRef idx="2">
+        <a:scrgbClr r="0" g="0" b="0"/>
+      </a:lnRef>
+      <a:fillRef idx="1">
+        <a:scrgbClr r="0" g="0" b="0"/>
+      </a:fillRef>
+      <a:effectRef idx="0">
+        <a:scrgbClr r="0" g="0" b="0"/>
+      </a:effectRef>
+      <a:fontRef idx="minor"/>
+    </dgm:style>
+  </dgm:styleLbl>
+  <dgm:styleLbl name="revTx">
+    <dgm:scene3d>
+      <a:camera prst="orthographicFront"/>
+      <a:lightRig rig="threePt" dir="t"/>
+    </dgm:scene3d>
+    <dgm:sp3d/>
+    <dgm:txPr/>
+    <dgm:style>
+      <a:lnRef idx="0">
+        <a:scrgbClr r="0" g="0" b="0"/>
+      </a:lnRef>
+      <a:fillRef idx="0">
+        <a:scrgbClr r="0" g="0" b="0"/>
+      </a:fillRef>
+      <a:effectRef idx="0">
+        <a:scrgbClr r="0" g="0" b="0"/>
+      </a:effectRef>
+      <a:fontRef idx="minor"/>
+    </dgm:style>
+  </dgm:styleLbl>
+</dgm:styleDef>
+</file>
+
+<file path=ppt/diagrams/quickStyle2.xml><?xml version="1.0" encoding="utf-8"?>
 <dgm:styleDef xmlns:dgm="http://schemas.openxmlformats.org/drawingml/2006/diagram" xmlns:a="http://schemas.openxmlformats.org/drawingml/2006/main" uniqueId="urn:microsoft.com/office/officeart/2005/8/quickstyle/simple1">
   <dgm:title val=""/>
   <dgm:desc val=""/>
@@ -6892,6 +9729,239 @@
 </p:sld>
 </file>
 
+<file path=ppt/slides/slide10.xml><?xml version="1.0" encoding="utf-8"?>
+<p:sld xmlns:a="http://schemas.openxmlformats.org/drawingml/2006/main" xmlns:r="http://schemas.openxmlformats.org/officeDocument/2006/relationships" xmlns:p="http://schemas.openxmlformats.org/presentationml/2006/main">
+  <p:cSld>
+    <p:spTree>
+      <p:nvGrpSpPr>
+        <p:cNvPr id="1" name=""/>
+        <p:cNvGrpSpPr/>
+        <p:nvPr/>
+      </p:nvGrpSpPr>
+      <p:grpSpPr>
+        <a:xfrm>
+          <a:off x="0" y="0"/>
+          <a:ext cx="0" cy="0"/>
+          <a:chOff x="0" y="0"/>
+          <a:chExt cx="0" cy="0"/>
+        </a:xfrm>
+      </p:grpSpPr>
+      <p:graphicFrame>
+        <p:nvGraphicFramePr>
+          <p:cNvPr id="4" name="Diagramm 3"/>
+          <p:cNvGraphicFramePr/>
+          <p:nvPr>
+            <p:extLst>
+              <p:ext uri="{D42A27DB-BD31-4B8C-83A1-F6EECF244321}">
+                <p14:modId xmlns:p14="http://schemas.microsoft.com/office/powerpoint/2010/main" val="2264623861"/>
+              </p:ext>
+            </p:extLst>
+          </p:nvPr>
+        </p:nvGraphicFramePr>
+        <p:xfrm>
+          <a:off x="535577" y="666206"/>
+          <a:ext cx="10818223" cy="5472127"/>
+        </p:xfrm>
+        <a:graphic>
+          <a:graphicData uri="http://schemas.openxmlformats.org/drawingml/2006/diagram">
+            <dgm:relIds xmlns:dgm="http://schemas.openxmlformats.org/drawingml/2006/diagram" xmlns:r="http://schemas.openxmlformats.org/officeDocument/2006/relationships" r:dm="rId2" r:lo="rId3" r:qs="rId4" r:cs="rId5"/>
+          </a:graphicData>
+        </a:graphic>
+      </p:graphicFrame>
+      <p:sp>
+        <p:nvSpPr>
+          <p:cNvPr id="6" name="Textfeld 5"/>
+          <p:cNvSpPr txBox="1"/>
+          <p:nvPr/>
+        </p:nvSpPr>
+        <p:spPr>
+          <a:xfrm>
+            <a:off x="2065019" y="5277395"/>
+            <a:ext cx="7759337" cy="369332"/>
+          </a:xfrm>
+          <a:prstGeom prst="rect">
+            <a:avLst/>
+          </a:prstGeom>
+          <a:noFill/>
+        </p:spPr>
+        <p:txBody>
+          <a:bodyPr wrap="square" rtlCol="0">
+            <a:spAutoFit/>
+          </a:bodyPr>
+          <a:lstStyle/>
+          <a:p>
+            <a:pPr algn="ctr"/>
+            <a:r>
+              <a:rPr lang="de-DE" dirty="0"/>
+              <a:t>5 Gründe sich für uns zu entscheiden!</a:t>
+            </a:r>
+          </a:p>
+        </p:txBody>
+      </p:sp>
+    </p:spTree>
+    <p:extLst>
+      <p:ext uri="{BB962C8B-B14F-4D97-AF65-F5344CB8AC3E}">
+        <p14:creationId xmlns:p14="http://schemas.microsoft.com/office/powerpoint/2010/main" val="1813590292"/>
+      </p:ext>
+    </p:extLst>
+  </p:cSld>
+  <p:clrMapOvr>
+    <a:masterClrMapping/>
+  </p:clrMapOvr>
+</p:sld>
+</file>
+
+<file path=ppt/slides/slide11.xml><?xml version="1.0" encoding="utf-8"?>
+<p:sld xmlns:a="http://schemas.openxmlformats.org/drawingml/2006/main" xmlns:r="http://schemas.openxmlformats.org/officeDocument/2006/relationships" xmlns:p="http://schemas.openxmlformats.org/presentationml/2006/main">
+  <p:cSld>
+    <p:spTree>
+      <p:nvGrpSpPr>
+        <p:cNvPr id="1" name=""/>
+        <p:cNvGrpSpPr/>
+        <p:nvPr/>
+      </p:nvGrpSpPr>
+      <p:grpSpPr>
+        <a:xfrm>
+          <a:off x="0" y="0"/>
+          <a:ext cx="0" cy="0"/>
+          <a:chOff x="0" y="0"/>
+          <a:chExt cx="0" cy="0"/>
+        </a:xfrm>
+      </p:grpSpPr>
+      <p:sp>
+        <p:nvSpPr>
+          <p:cNvPr id="2" name="Titel 1"/>
+          <p:cNvSpPr>
+            <a:spLocks noGrp="1"/>
+          </p:cNvSpPr>
+          <p:nvPr>
+            <p:ph type="title"/>
+          </p:nvPr>
+        </p:nvSpPr>
+        <p:spPr/>
+        <p:txBody>
+          <a:bodyPr/>
+          <a:lstStyle/>
+          <a:p>
+            <a:r>
+              <a:rPr lang="de-DE" dirty="0"/>
+              <a:t>Exemplarisches Vorgehen</a:t>
+            </a:r>
+          </a:p>
+        </p:txBody>
+      </p:sp>
+      <p:graphicFrame>
+        <p:nvGraphicFramePr>
+          <p:cNvPr id="4" name="Inhaltsplatzhalter 3"/>
+          <p:cNvGraphicFramePr>
+            <a:graphicFrameLocks noGrp="1"/>
+          </p:cNvGraphicFramePr>
+          <p:nvPr>
+            <p:ph idx="1"/>
+            <p:extLst>
+              <p:ext uri="{D42A27DB-BD31-4B8C-83A1-F6EECF244321}">
+                <p14:modId xmlns:p14="http://schemas.microsoft.com/office/powerpoint/2010/main" val="113537013"/>
+              </p:ext>
+            </p:extLst>
+          </p:nvPr>
+        </p:nvGraphicFramePr>
+        <p:xfrm>
+          <a:off x="838200" y="1825625"/>
+          <a:ext cx="10515600" cy="4351338"/>
+        </p:xfrm>
+        <a:graphic>
+          <a:graphicData uri="http://schemas.openxmlformats.org/drawingml/2006/diagram">
+            <dgm:relIds xmlns:dgm="http://schemas.openxmlformats.org/drawingml/2006/diagram" xmlns:r="http://schemas.openxmlformats.org/officeDocument/2006/relationships" r:dm="rId2" r:lo="rId3" r:qs="rId4" r:cs="rId5"/>
+          </a:graphicData>
+        </a:graphic>
+      </p:graphicFrame>
+    </p:spTree>
+    <p:extLst>
+      <p:ext uri="{BB962C8B-B14F-4D97-AF65-F5344CB8AC3E}">
+        <p14:creationId xmlns:p14="http://schemas.microsoft.com/office/powerpoint/2010/main" val="358724486"/>
+      </p:ext>
+    </p:extLst>
+  </p:cSld>
+  <p:clrMapOvr>
+    <a:masterClrMapping/>
+  </p:clrMapOvr>
+</p:sld>
+</file>
+
+<file path=ppt/slides/slide12.xml><?xml version="1.0" encoding="utf-8"?>
+<p:sld xmlns:a="http://schemas.openxmlformats.org/drawingml/2006/main" xmlns:r="http://schemas.openxmlformats.org/officeDocument/2006/relationships" xmlns:p="http://schemas.openxmlformats.org/presentationml/2006/main">
+  <p:cSld>
+    <p:spTree>
+      <p:nvGrpSpPr>
+        <p:cNvPr id="1" name=""/>
+        <p:cNvGrpSpPr/>
+        <p:nvPr/>
+      </p:nvGrpSpPr>
+      <p:grpSpPr>
+        <a:xfrm>
+          <a:off x="0" y="0"/>
+          <a:ext cx="0" cy="0"/>
+          <a:chOff x="0" y="0"/>
+          <a:chExt cx="0" cy="0"/>
+        </a:xfrm>
+      </p:grpSpPr>
+      <p:sp>
+        <p:nvSpPr>
+          <p:cNvPr id="4" name="Titel 3"/>
+          <p:cNvSpPr>
+            <a:spLocks noGrp="1"/>
+          </p:cNvSpPr>
+          <p:nvPr>
+            <p:ph type="title"/>
+          </p:nvPr>
+        </p:nvSpPr>
+        <p:spPr/>
+        <p:txBody>
+          <a:bodyPr/>
+          <a:lstStyle/>
+          <a:p>
+            <a:r>
+              <a:rPr lang="de-DE" dirty="0"/>
+              <a:t>Lassen Sie uns zusammen IHR Projektantragsmanagement auf eine neue Stufe heben!</a:t>
+            </a:r>
+          </a:p>
+        </p:txBody>
+      </p:sp>
+      <p:sp>
+        <p:nvSpPr>
+          <p:cNvPr id="5" name="Textplatzhalter 4"/>
+          <p:cNvSpPr>
+            <a:spLocks noGrp="1"/>
+          </p:cNvSpPr>
+          <p:nvPr>
+            <p:ph type="body" idx="1"/>
+          </p:nvPr>
+        </p:nvSpPr>
+        <p:spPr/>
+        <p:txBody>
+          <a:bodyPr/>
+          <a:lstStyle/>
+          <a:p>
+            <a:r>
+              <a:rPr lang="de-DE" dirty="0"/>
+              <a:t>Danke für Ihre Aufmerksamkeit.</a:t>
+            </a:r>
+          </a:p>
+        </p:txBody>
+      </p:sp>
+    </p:spTree>
+    <p:extLst>
+      <p:ext uri="{BB962C8B-B14F-4D97-AF65-F5344CB8AC3E}">
+        <p14:creationId xmlns:p14="http://schemas.microsoft.com/office/powerpoint/2010/main" val="1839926742"/>
+      </p:ext>
+    </p:extLst>
+  </p:cSld>
+  <p:clrMapOvr>
+    <a:masterClrMapping/>
+  </p:clrMapOvr>
+</p:sld>
+</file>
+
 <file path=ppt/slides/slide2.xml><?xml version="1.0" encoding="utf-8"?>
 <p:sld xmlns:a="http://schemas.openxmlformats.org/drawingml/2006/main" xmlns:r="http://schemas.openxmlformats.org/officeDocument/2006/relationships" xmlns:p="http://schemas.openxmlformats.org/presentationml/2006/main">
   <p:cSld>
@@ -7393,6 +10463,82 @@
       </p:grpSpPr>
       <p:sp>
         <p:nvSpPr>
+          <p:cNvPr id="2" name="Titel 1"/>
+          <p:cNvSpPr>
+            <a:spLocks noGrp="1"/>
+          </p:cNvSpPr>
+          <p:nvPr>
+            <p:ph type="title"/>
+          </p:nvPr>
+        </p:nvSpPr>
+        <p:spPr/>
+        <p:txBody>
+          <a:bodyPr/>
+          <a:lstStyle/>
+          <a:p>
+            <a:r>
+              <a:rPr lang="de-DE" dirty="0"/>
+              <a:t>Funktionen</a:t>
+            </a:r>
+          </a:p>
+        </p:txBody>
+      </p:sp>
+      <p:pic>
+        <p:nvPicPr>
+          <p:cNvPr id="6" name="Grafik 5"/>
+          <p:cNvPicPr>
+            <a:picLocks noChangeAspect="1"/>
+          </p:cNvPicPr>
+          <p:nvPr/>
+        </p:nvPicPr>
+        <p:blipFill>
+          <a:blip r:embed="rId2"/>
+          <a:stretch>
+            <a:fillRect/>
+          </a:stretch>
+        </p:blipFill>
+        <p:spPr>
+          <a:xfrm>
+            <a:off x="974407" y="1459502"/>
+            <a:ext cx="10089833" cy="5010150"/>
+          </a:xfrm>
+          <a:prstGeom prst="rect">
+            <a:avLst/>
+          </a:prstGeom>
+        </p:spPr>
+      </p:pic>
+    </p:spTree>
+    <p:extLst>
+      <p:ext uri="{BB962C8B-B14F-4D97-AF65-F5344CB8AC3E}">
+        <p14:creationId xmlns:p14="http://schemas.microsoft.com/office/powerpoint/2010/main" val="2188335336"/>
+      </p:ext>
+    </p:extLst>
+  </p:cSld>
+  <p:clrMapOvr>
+    <a:masterClrMapping/>
+  </p:clrMapOvr>
+</p:sld>
+</file>
+
+<file path=ppt/slides/slide5.xml><?xml version="1.0" encoding="utf-8"?>
+<p:sld xmlns:a="http://schemas.openxmlformats.org/drawingml/2006/main" xmlns:r="http://schemas.openxmlformats.org/officeDocument/2006/relationships" xmlns:p="http://schemas.openxmlformats.org/presentationml/2006/main">
+  <p:cSld>
+    <p:spTree>
+      <p:nvGrpSpPr>
+        <p:cNvPr id="1" name=""/>
+        <p:cNvGrpSpPr/>
+        <p:nvPr/>
+      </p:nvGrpSpPr>
+      <p:grpSpPr>
+        <a:xfrm>
+          <a:off x="0" y="0"/>
+          <a:ext cx="0" cy="0"/>
+          <a:chOff x="0" y="0"/>
+          <a:chExt cx="0" cy="0"/>
+        </a:xfrm>
+      </p:grpSpPr>
+      <p:sp>
+        <p:nvSpPr>
           <p:cNvPr id="5" name="Rechteck 4"/>
           <p:cNvSpPr/>
           <p:nvPr/>
@@ -7541,7 +10687,116 @@
 </p:sld>
 </file>
 
-<file path=ppt/slides/slide5.xml><?xml version="1.0" encoding="utf-8"?>
+<file path=ppt/slides/slide6.xml><?xml version="1.0" encoding="utf-8"?>
+<p:sld xmlns:a="http://schemas.openxmlformats.org/drawingml/2006/main" xmlns:r="http://schemas.openxmlformats.org/officeDocument/2006/relationships" xmlns:p="http://schemas.openxmlformats.org/presentationml/2006/main">
+  <p:cSld>
+    <p:spTree>
+      <p:nvGrpSpPr>
+        <p:cNvPr id="1" name=""/>
+        <p:cNvGrpSpPr/>
+        <p:nvPr/>
+      </p:nvGrpSpPr>
+      <p:grpSpPr>
+        <a:xfrm>
+          <a:off x="0" y="0"/>
+          <a:ext cx="0" cy="0"/>
+          <a:chOff x="0" y="0"/>
+          <a:chExt cx="0" cy="0"/>
+        </a:xfrm>
+      </p:grpSpPr>
+      <p:sp>
+        <p:nvSpPr>
+          <p:cNvPr id="2" name="Titel 1"/>
+          <p:cNvSpPr>
+            <a:spLocks noGrp="1"/>
+          </p:cNvSpPr>
+          <p:nvPr>
+            <p:ph type="title"/>
+          </p:nvPr>
+        </p:nvSpPr>
+        <p:spPr/>
+        <p:txBody>
+          <a:bodyPr/>
+          <a:lstStyle/>
+          <a:p>
+            <a:r>
+              <a:rPr lang="de-DE" dirty="0"/>
+              <a:t>Was werden wir Ihnen zeigen?</a:t>
+            </a:r>
+          </a:p>
+        </p:txBody>
+      </p:sp>
+      <p:sp>
+        <p:nvSpPr>
+          <p:cNvPr id="3" name="Inhaltsplatzhalter 2"/>
+          <p:cNvSpPr>
+            <a:spLocks noGrp="1"/>
+          </p:cNvSpPr>
+          <p:nvPr>
+            <p:ph idx="1"/>
+          </p:nvPr>
+        </p:nvSpPr>
+        <p:spPr/>
+        <p:txBody>
+          <a:bodyPr/>
+          <a:lstStyle/>
+          <a:p>
+            <a:r>
+              <a:rPr lang="de-DE" dirty="0"/>
+              <a:t>Ihre Applikation</a:t>
+            </a:r>
+          </a:p>
+          <a:p>
+            <a:endParaRPr lang="de-DE" dirty="0"/>
+          </a:p>
+          <a:p>
+            <a:r>
+              <a:rPr lang="de-DE" dirty="0"/>
+              <a:t>Das </a:t>
+            </a:r>
+            <a:r>
+              <a:rPr lang="de-DE" u="sng" dirty="0"/>
+              <a:t>einfache</a:t>
+            </a:r>
+            <a:r>
+              <a:rPr lang="de-DE" dirty="0"/>
+              <a:t> Verwalten Ihrer Stammdaten</a:t>
+            </a:r>
+          </a:p>
+          <a:p>
+            <a:endParaRPr lang="de-DE" dirty="0"/>
+          </a:p>
+          <a:p>
+            <a:r>
+              <a:rPr lang="de-DE" dirty="0"/>
+              <a:t>Managen der Anträge</a:t>
+            </a:r>
+          </a:p>
+          <a:p>
+            <a:endParaRPr lang="de-DE" dirty="0"/>
+          </a:p>
+          <a:p>
+            <a:r>
+              <a:rPr lang="de-DE" dirty="0"/>
+              <a:t>Statistiken und Features</a:t>
+            </a:r>
+          </a:p>
+        </p:txBody>
+      </p:sp>
+    </p:spTree>
+    <p:extLst>
+      <p:ext uri="{BB962C8B-B14F-4D97-AF65-F5344CB8AC3E}">
+        <p14:creationId xmlns:p14="http://schemas.microsoft.com/office/powerpoint/2010/main" val="3998011708"/>
+      </p:ext>
+    </p:extLst>
+  </p:cSld>
+  <p:clrMapOvr>
+    <a:masterClrMapping/>
+  </p:clrMapOvr>
+</p:sld>
+</file>
+
+<file path=ppt/slides/slide7.xml><?xml version="1.0" encoding="utf-8"?>
 <p:sld xmlns:a="http://schemas.openxmlformats.org/drawingml/2006/main" xmlns:r="http://schemas.openxmlformats.org/officeDocument/2006/relationships" xmlns:p="http://schemas.openxmlformats.org/presentationml/2006/main">
   <p:cSld>
     <p:spTree>
@@ -7575,6 +10830,66 @@
           <a:p>
             <a:r>
               <a:rPr lang="de-DE" dirty="0"/>
+              <a:t>Ihre </a:t>
+            </a:r>
+            <a:r>
+              <a:rPr lang="de-DE" b="1" dirty="0"/>
+              <a:t>Applikation</a:t>
+            </a:r>
+            <a:r>
+              <a:rPr lang="de-DE" dirty="0"/>
+              <a:t> sagt mehr als 1.000 Worte!</a:t>
+            </a:r>
+          </a:p>
+        </p:txBody>
+      </p:sp>
+    </p:spTree>
+    <p:extLst>
+      <p:ext uri="{BB962C8B-B14F-4D97-AF65-F5344CB8AC3E}">
+        <p14:creationId xmlns:p14="http://schemas.microsoft.com/office/powerpoint/2010/main" val="411625894"/>
+      </p:ext>
+    </p:extLst>
+  </p:cSld>
+  <p:clrMapOvr>
+    <a:masterClrMapping/>
+  </p:clrMapOvr>
+</p:sld>
+</file>
+
+<file path=ppt/slides/slide8.xml><?xml version="1.0" encoding="utf-8"?>
+<p:sld xmlns:a="http://schemas.openxmlformats.org/drawingml/2006/main" xmlns:r="http://schemas.openxmlformats.org/officeDocument/2006/relationships" xmlns:p="http://schemas.openxmlformats.org/presentationml/2006/main">
+  <p:cSld>
+    <p:spTree>
+      <p:nvGrpSpPr>
+        <p:cNvPr id="1" name=""/>
+        <p:cNvGrpSpPr/>
+        <p:nvPr/>
+      </p:nvGrpSpPr>
+      <p:grpSpPr>
+        <a:xfrm>
+          <a:off x="0" y="0"/>
+          <a:ext cx="0" cy="0"/>
+          <a:chOff x="0" y="0"/>
+          <a:chExt cx="0" cy="0"/>
+        </a:xfrm>
+      </p:grpSpPr>
+      <p:sp>
+        <p:nvSpPr>
+          <p:cNvPr id="4" name="Titel 3"/>
+          <p:cNvSpPr>
+            <a:spLocks noGrp="1"/>
+          </p:cNvSpPr>
+          <p:nvPr>
+            <p:ph type="title"/>
+          </p:nvPr>
+        </p:nvSpPr>
+        <p:spPr/>
+        <p:txBody>
+          <a:bodyPr/>
+          <a:lstStyle/>
+          <a:p>
+            <a:r>
+              <a:rPr lang="de-DE" dirty="0"/>
               <a:t>Noch nicht überzeugt?</a:t>
             </a:r>
           </a:p>
@@ -7593,7 +10908,7 @@
 </p:sld>
 </file>
 
-<file path=ppt/slides/slide6.xml><?xml version="1.0" encoding="utf-8"?>
+<file path=ppt/slides/slide9.xml><?xml version="1.0" encoding="utf-8"?>
 <p:sld xmlns:a="http://schemas.openxmlformats.org/drawingml/2006/main" xmlns:r="http://schemas.openxmlformats.org/officeDocument/2006/relationships" xmlns:p="http://schemas.openxmlformats.org/presentationml/2006/main">
   <p:cSld>
     <p:spTree>
@@ -7751,162 +11066,6 @@
     <p:extLst>
       <p:ext uri="{BB962C8B-B14F-4D97-AF65-F5344CB8AC3E}">
         <p14:creationId xmlns:p14="http://schemas.microsoft.com/office/powerpoint/2010/main" val="2628804621"/>
-      </p:ext>
-    </p:extLst>
-  </p:cSld>
-  <p:clrMapOvr>
-    <a:masterClrMapping/>
-  </p:clrMapOvr>
-</p:sld>
-</file>
-
-<file path=ppt/slides/slide7.xml><?xml version="1.0" encoding="utf-8"?>
-<p:sld xmlns:a="http://schemas.openxmlformats.org/drawingml/2006/main" xmlns:r="http://schemas.openxmlformats.org/officeDocument/2006/relationships" xmlns:p="http://schemas.openxmlformats.org/presentationml/2006/main">
-  <p:cSld>
-    <p:spTree>
-      <p:nvGrpSpPr>
-        <p:cNvPr id="1" name=""/>
-        <p:cNvGrpSpPr/>
-        <p:nvPr/>
-      </p:nvGrpSpPr>
-      <p:grpSpPr>
-        <a:xfrm>
-          <a:off x="0" y="0"/>
-          <a:ext cx="0" cy="0"/>
-          <a:chOff x="0" y="0"/>
-          <a:chExt cx="0" cy="0"/>
-        </a:xfrm>
-      </p:grpSpPr>
-      <p:graphicFrame>
-        <p:nvGraphicFramePr>
-          <p:cNvPr id="4" name="Diagramm 3"/>
-          <p:cNvGraphicFramePr/>
-          <p:nvPr>
-            <p:extLst>
-              <p:ext uri="{D42A27DB-BD31-4B8C-83A1-F6EECF244321}">
-                <p14:modId xmlns:p14="http://schemas.microsoft.com/office/powerpoint/2010/main" val="2264623861"/>
-              </p:ext>
-            </p:extLst>
-          </p:nvPr>
-        </p:nvGraphicFramePr>
-        <p:xfrm>
-          <a:off x="535577" y="666206"/>
-          <a:ext cx="10818223" cy="5472127"/>
-        </p:xfrm>
-        <a:graphic>
-          <a:graphicData uri="http://schemas.openxmlformats.org/drawingml/2006/diagram">
-            <dgm:relIds xmlns:dgm="http://schemas.openxmlformats.org/drawingml/2006/diagram" xmlns:r="http://schemas.openxmlformats.org/officeDocument/2006/relationships" r:dm="rId2" r:lo="rId3" r:qs="rId4" r:cs="rId5"/>
-          </a:graphicData>
-        </a:graphic>
-      </p:graphicFrame>
-      <p:sp>
-        <p:nvSpPr>
-          <p:cNvPr id="6" name="Textfeld 5"/>
-          <p:cNvSpPr txBox="1"/>
-          <p:nvPr/>
-        </p:nvSpPr>
-        <p:spPr>
-          <a:xfrm>
-            <a:off x="2065019" y="5277395"/>
-            <a:ext cx="7759337" cy="369332"/>
-          </a:xfrm>
-          <a:prstGeom prst="rect">
-            <a:avLst/>
-          </a:prstGeom>
-          <a:noFill/>
-        </p:spPr>
-        <p:txBody>
-          <a:bodyPr wrap="square" rtlCol="0">
-            <a:spAutoFit/>
-          </a:bodyPr>
-          <a:lstStyle/>
-          <a:p>
-            <a:pPr algn="ctr"/>
-            <a:r>
-              <a:rPr lang="de-DE" dirty="0"/>
-              <a:t>5 Gründe sich für uns zu entscheiden!</a:t>
-            </a:r>
-          </a:p>
-        </p:txBody>
-      </p:sp>
-    </p:spTree>
-    <p:extLst>
-      <p:ext uri="{BB962C8B-B14F-4D97-AF65-F5344CB8AC3E}">
-        <p14:creationId xmlns:p14="http://schemas.microsoft.com/office/powerpoint/2010/main" val="1813590292"/>
-      </p:ext>
-    </p:extLst>
-  </p:cSld>
-  <p:clrMapOvr>
-    <a:masterClrMapping/>
-  </p:clrMapOvr>
-</p:sld>
-</file>
-
-<file path=ppt/slides/slide8.xml><?xml version="1.0" encoding="utf-8"?>
-<p:sld xmlns:a="http://schemas.openxmlformats.org/drawingml/2006/main" xmlns:r="http://schemas.openxmlformats.org/officeDocument/2006/relationships" xmlns:p="http://schemas.openxmlformats.org/presentationml/2006/main">
-  <p:cSld>
-    <p:spTree>
-      <p:nvGrpSpPr>
-        <p:cNvPr id="1" name=""/>
-        <p:cNvGrpSpPr/>
-        <p:nvPr/>
-      </p:nvGrpSpPr>
-      <p:grpSpPr>
-        <a:xfrm>
-          <a:off x="0" y="0"/>
-          <a:ext cx="0" cy="0"/>
-          <a:chOff x="0" y="0"/>
-          <a:chExt cx="0" cy="0"/>
-        </a:xfrm>
-      </p:grpSpPr>
-      <p:sp>
-        <p:nvSpPr>
-          <p:cNvPr id="4" name="Titel 3"/>
-          <p:cNvSpPr>
-            <a:spLocks noGrp="1"/>
-          </p:cNvSpPr>
-          <p:nvPr>
-            <p:ph type="title"/>
-          </p:nvPr>
-        </p:nvSpPr>
-        <p:spPr/>
-        <p:txBody>
-          <a:bodyPr/>
-          <a:lstStyle/>
-          <a:p>
-            <a:r>
-              <a:rPr lang="de-DE" dirty="0"/>
-              <a:t>Lassen Sie uns zusammen IHR Projektantragsmanagement auf eine neue Stufe heben!</a:t>
-            </a:r>
-          </a:p>
-        </p:txBody>
-      </p:sp>
-      <p:sp>
-        <p:nvSpPr>
-          <p:cNvPr id="5" name="Textplatzhalter 4"/>
-          <p:cNvSpPr>
-            <a:spLocks noGrp="1"/>
-          </p:cNvSpPr>
-          <p:nvPr>
-            <p:ph type="body" idx="1"/>
-          </p:nvPr>
-        </p:nvSpPr>
-        <p:spPr/>
-        <p:txBody>
-          <a:bodyPr/>
-          <a:lstStyle/>
-          <a:p>
-            <a:r>
-              <a:rPr lang="de-DE" dirty="0"/>
-              <a:t>Danke für Ihre Aufmerksamkeit.</a:t>
-            </a:r>
-          </a:p>
-        </p:txBody>
-      </p:sp>
-    </p:spTree>
-    <p:extLst>
-      <p:ext uri="{BB962C8B-B14F-4D97-AF65-F5344CB8AC3E}">
-        <p14:creationId xmlns:p14="http://schemas.microsoft.com/office/powerpoint/2010/main" val="1839926742"/>
       </p:ext>
     </p:extLst>
   </p:cSld>

</xml_diff>